<commit_message>
Ready to slide 4.
</commit_message>
<xml_diff>
--- a/CodePro-Analytix.pptx
+++ b/CodePro-Analytix.pptx
@@ -109,6 +109,22 @@
       </a:defRPr>
     </a:lvl9pPr>
   </p:defaultTextStyle>
+  <p:extLst>
+    <p:ext uri="{EFAFB233-063F-42B5-8137-9DF3F51BA10A}">
+      <p15:sldGuideLst xmlns:p15="http://schemas.microsoft.com/office/powerpoint/2012/main">
+        <p15:guide id="1" orient="horz" pos="2160">
+          <p15:clr>
+            <a:srgbClr val="A4A3A4"/>
+          </p15:clr>
+        </p15:guide>
+        <p15:guide id="2" pos="2880">
+          <p15:clr>
+            <a:srgbClr val="A4A3A4"/>
+          </p15:clr>
+        </p15:guide>
+      </p15:sldGuideLst>
+    </p:ext>
+  </p:extLst>
 </p:presentation>
 </file>
 
@@ -306,7 +322,7 @@
           <a:p>
             <a:fld id="{68B45380-BEAC-40B8-8A9E-2284AB95F218}" type="datetimeFigureOut">
               <a:rPr lang="en-US" smtClean="0"/>
-              <a:t>6/18/2015</a:t>
+              <a:t>6/22/2015</a:t>
             </a:fld>
             <a:endParaRPr lang="en-US"/>
           </a:p>
@@ -471,7 +487,7 @@
           <a:p>
             <a:fld id="{68B45380-BEAC-40B8-8A9E-2284AB95F218}" type="datetimeFigureOut">
               <a:rPr lang="en-US" smtClean="0"/>
-              <a:t>6/18/2015</a:t>
+              <a:t>6/22/2015</a:t>
             </a:fld>
             <a:endParaRPr lang="en-US"/>
           </a:p>
@@ -646,7 +662,7 @@
           <a:p>
             <a:fld id="{68B45380-BEAC-40B8-8A9E-2284AB95F218}" type="datetimeFigureOut">
               <a:rPr lang="en-US" smtClean="0"/>
-              <a:t>6/18/2015</a:t>
+              <a:t>6/22/2015</a:t>
             </a:fld>
             <a:endParaRPr lang="en-US"/>
           </a:p>
@@ -811,7 +827,7 @@
           <a:p>
             <a:fld id="{68B45380-BEAC-40B8-8A9E-2284AB95F218}" type="datetimeFigureOut">
               <a:rPr lang="en-US" smtClean="0"/>
-              <a:t>6/18/2015</a:t>
+              <a:t>6/22/2015</a:t>
             </a:fld>
             <a:endParaRPr lang="en-US"/>
           </a:p>
@@ -1052,7 +1068,7 @@
           <a:p>
             <a:fld id="{68B45380-BEAC-40B8-8A9E-2284AB95F218}" type="datetimeFigureOut">
               <a:rPr lang="en-US" smtClean="0"/>
-              <a:t>6/18/2015</a:t>
+              <a:t>6/22/2015</a:t>
             </a:fld>
             <a:endParaRPr lang="en-US"/>
           </a:p>
@@ -1335,7 +1351,7 @@
           <a:p>
             <a:fld id="{68B45380-BEAC-40B8-8A9E-2284AB95F218}" type="datetimeFigureOut">
               <a:rPr lang="en-US" smtClean="0"/>
-              <a:t>6/18/2015</a:t>
+              <a:t>6/22/2015</a:t>
             </a:fld>
             <a:endParaRPr lang="en-US"/>
           </a:p>
@@ -1764,7 +1780,7 @@
           <a:p>
             <a:fld id="{68B45380-BEAC-40B8-8A9E-2284AB95F218}" type="datetimeFigureOut">
               <a:rPr lang="en-US" smtClean="0"/>
-              <a:t>6/18/2015</a:t>
+              <a:t>6/22/2015</a:t>
             </a:fld>
             <a:endParaRPr lang="en-US"/>
           </a:p>
@@ -1877,7 +1893,7 @@
           <a:p>
             <a:fld id="{68B45380-BEAC-40B8-8A9E-2284AB95F218}" type="datetimeFigureOut">
               <a:rPr lang="en-US" smtClean="0"/>
-              <a:t>6/18/2015</a:t>
+              <a:t>6/22/2015</a:t>
             </a:fld>
             <a:endParaRPr lang="en-US"/>
           </a:p>
@@ -1967,7 +1983,7 @@
           <a:p>
             <a:fld id="{68B45380-BEAC-40B8-8A9E-2284AB95F218}" type="datetimeFigureOut">
               <a:rPr lang="en-US" smtClean="0"/>
-              <a:t>6/18/2015</a:t>
+              <a:t>6/22/2015</a:t>
             </a:fld>
             <a:endParaRPr lang="en-US"/>
           </a:p>
@@ -2156,7 +2172,7 @@
           <a:p>
             <a:fld id="{68B45380-BEAC-40B8-8A9E-2284AB95F218}" type="datetimeFigureOut">
               <a:rPr lang="en-US" smtClean="0"/>
-              <a:t>6/18/2015</a:t>
+              <a:t>6/22/2015</a:t>
             </a:fld>
             <a:endParaRPr lang="en-US"/>
           </a:p>
@@ -2474,7 +2490,7 @@
           <a:p>
             <a:fld id="{68B45380-BEAC-40B8-8A9E-2284AB95F218}" type="datetimeFigureOut">
               <a:rPr lang="en-US" smtClean="0"/>
-              <a:t>6/18/2015</a:t>
+              <a:t>6/22/2015</a:t>
             </a:fld>
             <a:endParaRPr lang="en-US"/>
           </a:p>
@@ -2853,7 +2869,7 @@
           <a:p>
             <a:fld id="{68B45380-BEAC-40B8-8A9E-2284AB95F218}" type="datetimeFigureOut">
               <a:rPr lang="en-US" smtClean="0"/>
-              <a:t>6/18/2015</a:t>
+              <a:t>6/22/2015</a:t>
             </a:fld>
             <a:endParaRPr lang="en-US"/>
           </a:p>
@@ -3399,7 +3415,26 @@
           <a:p>
             <a:r>
               <a:rPr lang="bg-BG" dirty="0" smtClean="0"/>
-              <a:t>Добавка към </a:t>
+              <a:t>Набор от инструменти за анализ на </a:t>
+            </a:r>
+            <a:r>
+              <a:rPr lang="en-US" dirty="0" smtClean="0"/>
+              <a:t>Java </a:t>
+            </a:r>
+            <a:r>
+              <a:rPr lang="bg-BG" dirty="0" smtClean="0"/>
+              <a:t>код</a:t>
+            </a:r>
+            <a:endParaRPr lang="en-US" dirty="0" smtClean="0"/>
+          </a:p>
+          <a:p>
+            <a:r>
+              <a:rPr lang="bg-BG" dirty="0" smtClean="0"/>
+              <a:t>Добавка </a:t>
+            </a:r>
+            <a:r>
+              <a:rPr lang="bg-BG" dirty="0" smtClean="0"/>
+              <a:t>към </a:t>
             </a:r>
             <a:r>
               <a:rPr lang="en-US" dirty="0" smtClean="0"/>
@@ -3420,9 +3455,11 @@
           </a:p>
           <a:p>
             <a:r>
-              <a:rPr lang="bg-BG" dirty="0" err="1" smtClean="0"/>
-              <a:t>аксфоийдсоиф</a:t>
-            </a:r>
+              <a:rPr lang="bg-BG" dirty="0" smtClean="0"/>
+              <a:t>Включва множество възможности</a:t>
+            </a:r>
+          </a:p>
+          <a:p>
             <a:endParaRPr lang="en-US" dirty="0"/>
           </a:p>
         </p:txBody>
@@ -3514,41 +3551,34 @@
           <a:p>
             <a:r>
               <a:rPr lang="bg-BG" dirty="0" smtClean="0"/>
-              <a:t>Контролира писането на хубав код</a:t>
-            </a:r>
-          </a:p>
-          <a:p>
-            <a:r>
-              <a:rPr lang="bg-BG" dirty="0" err="1" smtClean="0"/>
-              <a:t>Гфд</a:t>
+              <a:t>Големи екипи</a:t>
+            </a:r>
+          </a:p>
+          <a:p>
+            <a:r>
+              <a:rPr lang="bg-BG" dirty="0" smtClean="0"/>
+              <a:t>Контролира </a:t>
+            </a:r>
+            <a:r>
+              <a:rPr lang="bg-BG" dirty="0" smtClean="0"/>
+              <a:t>писането на хубав код</a:t>
+            </a:r>
+          </a:p>
+          <a:p>
+            <a:r>
+              <a:rPr lang="bg-BG" dirty="0" smtClean="0"/>
+              <a:t>По-лесно улавяне на възможни бъгове</a:t>
             </a:r>
             <a:endParaRPr lang="bg-BG" dirty="0" smtClean="0"/>
           </a:p>
           <a:p>
             <a:r>
-              <a:rPr lang="bg-BG" dirty="0" err="1" smtClean="0"/>
-              <a:t>Ггдф</a:t>
-            </a:r>
-            <a:endParaRPr lang="bg-BG" dirty="0" smtClean="0"/>
-          </a:p>
-          <a:p>
-            <a:r>
               <a:rPr lang="bg-BG" dirty="0" smtClean="0"/>
-              <a:t>Г</a:t>
-            </a:r>
-          </a:p>
-          <a:p>
-            <a:r>
-              <a:rPr lang="bg-BG" dirty="0" err="1" smtClean="0"/>
-              <a:t>дсф</a:t>
+              <a:t>Изчистване на проекта от ненужни файлове, ресурси, класове, усложнения и други</a:t>
             </a:r>
             <a:endParaRPr lang="bg-BG" dirty="0"/>
           </a:p>
           <a:p>
-            <a:r>
-              <a:rPr lang="bg-BG" dirty="0" err="1" smtClean="0"/>
-              <a:t>дфг</a:t>
-            </a:r>
             <a:endParaRPr lang="en-US" dirty="0"/>
           </a:p>
         </p:txBody>
@@ -3646,7 +3676,11 @@
             </a:r>
             <a:r>
               <a:rPr lang="bg-BG" dirty="0"/>
-              <a:t>съдържа в себе си множество инструменти за различен тип анализ на програмен код. </a:t>
+              <a:t>съдържа в себе си множество инструменти за различен тип анализ на програмен </a:t>
+            </a:r>
+            <a:r>
+              <a:rPr lang="bg-BG" dirty="0" smtClean="0"/>
+              <a:t>код </a:t>
             </a:r>
             <a:endParaRPr lang="bg-BG" dirty="0" smtClean="0"/>
           </a:p>
@@ -3661,8 +3695,9 @@
             </a:r>
             <a:r>
               <a:rPr lang="bg-BG" dirty="0" smtClean="0"/>
-              <a:t>му.</a:t>
-            </a:r>
+              <a:t>му</a:t>
+            </a:r>
+            <a:endParaRPr lang="bg-BG" dirty="0" smtClean="0"/>
           </a:p>
           <a:p>
             <a:r>
@@ -3671,7 +3706,29 @@
             </a:r>
             <a:r>
               <a:rPr lang="bg-BG" dirty="0"/>
-              <a:t>се постига, като се анализира кода и инструментът открива ненужни усложнения, грешки и др.</a:t>
+              <a:t>се постига, като се анализира кода и инструментът открива ненужни усложнения, грешки и </a:t>
+            </a:r>
+            <a:r>
+              <a:rPr lang="bg-BG" dirty="0" smtClean="0"/>
+              <a:t>други</a:t>
+            </a:r>
+          </a:p>
+          <a:p>
+            <a:r>
+              <a:rPr lang="bg-BG" dirty="0" smtClean="0"/>
+              <a:t>Разделен е на компоненти и подкомпоненти</a:t>
+            </a:r>
+          </a:p>
+          <a:p>
+            <a:r>
+              <a:rPr lang="bg-BG" dirty="0" smtClean="0"/>
+              <a:t>Не е нужно да инсталираме всички компоненти</a:t>
+            </a:r>
+          </a:p>
+          <a:p>
+            <a:r>
+              <a:rPr lang="bg-BG" dirty="0" smtClean="0"/>
+              <a:t>Ще разгледаме най-важните от тях</a:t>
             </a:r>
             <a:endParaRPr lang="en-US" dirty="0"/>
           </a:p>

</xml_diff>

<commit_message>
Final version of the presentation.
</commit_message>
<xml_diff>
--- a/CodePro-Analytix.pptx
+++ b/CodePro-Analytix.pptx
@@ -9,8 +9,12 @@
     <p:sldId id="257" r:id="rId3"/>
     <p:sldId id="258" r:id="rId4"/>
     <p:sldId id="259" r:id="rId5"/>
-    <p:sldId id="260" r:id="rId6"/>
-    <p:sldId id="261" r:id="rId7"/>
+    <p:sldId id="266" r:id="rId6"/>
+    <p:sldId id="265" r:id="rId7"/>
+    <p:sldId id="264" r:id="rId8"/>
+    <p:sldId id="262" r:id="rId9"/>
+    <p:sldId id="263" r:id="rId10"/>
+    <p:sldId id="261" r:id="rId11"/>
   </p:sldIdLst>
   <p:sldSz cx="9144000" cy="6858000" type="screen4x3"/>
   <p:notesSz cx="6858000" cy="9144000"/>
@@ -111,7 +115,7 @@
   </p:defaultTextStyle>
   <p:extLst>
     <p:ext uri="{EFAFB233-063F-42B5-8137-9DF3F51BA10A}">
-      <p15:sldGuideLst xmlns:p15="http://schemas.microsoft.com/office/powerpoint/2012/main">
+      <p15:sldGuideLst xmlns:p15="http://schemas.microsoft.com/office/powerpoint/2012/main" xmlns="">
         <p15:guide id="1" orient="horz" pos="2160">
           <p15:clr>
             <a:srgbClr val="A4A3A4"/>
@@ -322,7 +326,7 @@
           <a:p>
             <a:fld id="{68B45380-BEAC-40B8-8A9E-2284AB95F218}" type="datetimeFigureOut">
               <a:rPr lang="en-US" smtClean="0"/>
-              <a:t>6/22/2015</a:t>
+              <a:t>6/23/2015</a:t>
             </a:fld>
             <a:endParaRPr lang="en-US"/>
           </a:p>
@@ -487,7 +491,7 @@
           <a:p>
             <a:fld id="{68B45380-BEAC-40B8-8A9E-2284AB95F218}" type="datetimeFigureOut">
               <a:rPr lang="en-US" smtClean="0"/>
-              <a:t>6/22/2015</a:t>
+              <a:t>6/23/2015</a:t>
             </a:fld>
             <a:endParaRPr lang="en-US"/>
           </a:p>
@@ -662,7 +666,7 @@
           <a:p>
             <a:fld id="{68B45380-BEAC-40B8-8A9E-2284AB95F218}" type="datetimeFigureOut">
               <a:rPr lang="en-US" smtClean="0"/>
-              <a:t>6/22/2015</a:t>
+              <a:t>6/23/2015</a:t>
             </a:fld>
             <a:endParaRPr lang="en-US"/>
           </a:p>
@@ -827,7 +831,7 @@
           <a:p>
             <a:fld id="{68B45380-BEAC-40B8-8A9E-2284AB95F218}" type="datetimeFigureOut">
               <a:rPr lang="en-US" smtClean="0"/>
-              <a:t>6/22/2015</a:t>
+              <a:t>6/23/2015</a:t>
             </a:fld>
             <a:endParaRPr lang="en-US"/>
           </a:p>
@@ -1068,7 +1072,7 @@
           <a:p>
             <a:fld id="{68B45380-BEAC-40B8-8A9E-2284AB95F218}" type="datetimeFigureOut">
               <a:rPr lang="en-US" smtClean="0"/>
-              <a:t>6/22/2015</a:t>
+              <a:t>6/23/2015</a:t>
             </a:fld>
             <a:endParaRPr lang="en-US"/>
           </a:p>
@@ -1351,7 +1355,7 @@
           <a:p>
             <a:fld id="{68B45380-BEAC-40B8-8A9E-2284AB95F218}" type="datetimeFigureOut">
               <a:rPr lang="en-US" smtClean="0"/>
-              <a:t>6/22/2015</a:t>
+              <a:t>6/23/2015</a:t>
             </a:fld>
             <a:endParaRPr lang="en-US"/>
           </a:p>
@@ -1780,7 +1784,7 @@
           <a:p>
             <a:fld id="{68B45380-BEAC-40B8-8A9E-2284AB95F218}" type="datetimeFigureOut">
               <a:rPr lang="en-US" smtClean="0"/>
-              <a:t>6/22/2015</a:t>
+              <a:t>6/23/2015</a:t>
             </a:fld>
             <a:endParaRPr lang="en-US"/>
           </a:p>
@@ -1893,7 +1897,7 @@
           <a:p>
             <a:fld id="{68B45380-BEAC-40B8-8A9E-2284AB95F218}" type="datetimeFigureOut">
               <a:rPr lang="en-US" smtClean="0"/>
-              <a:t>6/22/2015</a:t>
+              <a:t>6/23/2015</a:t>
             </a:fld>
             <a:endParaRPr lang="en-US"/>
           </a:p>
@@ -1983,7 +1987,7 @@
           <a:p>
             <a:fld id="{68B45380-BEAC-40B8-8A9E-2284AB95F218}" type="datetimeFigureOut">
               <a:rPr lang="en-US" smtClean="0"/>
-              <a:t>6/22/2015</a:t>
+              <a:t>6/23/2015</a:t>
             </a:fld>
             <a:endParaRPr lang="en-US"/>
           </a:p>
@@ -2172,7 +2176,7 @@
           <a:p>
             <a:fld id="{68B45380-BEAC-40B8-8A9E-2284AB95F218}" type="datetimeFigureOut">
               <a:rPr lang="en-US" smtClean="0"/>
-              <a:t>6/22/2015</a:t>
+              <a:t>6/23/2015</a:t>
             </a:fld>
             <a:endParaRPr lang="en-US"/>
           </a:p>
@@ -2490,7 +2494,7 @@
           <a:p>
             <a:fld id="{68B45380-BEAC-40B8-8A9E-2284AB95F218}" type="datetimeFigureOut">
               <a:rPr lang="en-US" smtClean="0"/>
-              <a:t>6/22/2015</a:t>
+              <a:t>6/23/2015</a:t>
             </a:fld>
             <a:endParaRPr lang="en-US"/>
           </a:p>
@@ -2869,7 +2873,7 @@
           <a:p>
             <a:fld id="{68B45380-BEAC-40B8-8A9E-2284AB95F218}" type="datetimeFigureOut">
               <a:rPr lang="en-US" smtClean="0"/>
-              <a:t>6/22/2015</a:t>
+              <a:t>6/23/2015</a:t>
             </a:fld>
             <a:endParaRPr lang="en-US"/>
           </a:p>
@@ -3354,6 +3358,65 @@
 </p:sld>
 </file>
 
+<file path=ppt/slides/slide10.xml><?xml version="1.0" encoding="utf-8"?>
+<p:sld xmlns:a="http://schemas.openxmlformats.org/drawingml/2006/main" xmlns:r="http://schemas.openxmlformats.org/officeDocument/2006/relationships" xmlns:p="http://schemas.openxmlformats.org/presentationml/2006/main">
+  <p:cSld>
+    <p:spTree>
+      <p:nvGrpSpPr>
+        <p:cNvPr id="1" name=""/>
+        <p:cNvGrpSpPr/>
+        <p:nvPr/>
+      </p:nvGrpSpPr>
+      <p:grpSpPr>
+        <a:xfrm>
+          <a:off x="0" y="0"/>
+          <a:ext cx="0" cy="0"/>
+          <a:chOff x="0" y="0"/>
+          <a:chExt cx="0" cy="0"/>
+        </a:xfrm>
+      </p:grpSpPr>
+      <p:sp>
+        <p:nvSpPr>
+          <p:cNvPr id="2" name="Title 1"/>
+          <p:cNvSpPr>
+            <a:spLocks noGrp="1"/>
+          </p:cNvSpPr>
+          <p:nvPr>
+            <p:ph type="title"/>
+          </p:nvPr>
+        </p:nvSpPr>
+        <p:spPr>
+          <a:xfrm>
+            <a:off x="467544" y="2852936"/>
+            <a:ext cx="7620000" cy="1143000"/>
+          </a:xfrm>
+        </p:spPr>
+        <p:txBody>
+          <a:bodyPr/>
+          <a:lstStyle/>
+          <a:p>
+            <a:pPr algn="ctr"/>
+            <a:r>
+              <a:rPr lang="bg-BG" dirty="0" smtClean="0"/>
+              <a:t>Демонстрация</a:t>
+            </a:r>
+            <a:endParaRPr lang="en-US" dirty="0"/>
+          </a:p>
+        </p:txBody>
+      </p:sp>
+    </p:spTree>
+    <p:extLst>
+      <p:ext uri="{BB962C8B-B14F-4D97-AF65-F5344CB8AC3E}">
+        <p14:creationId xmlns:p14="http://schemas.microsoft.com/office/powerpoint/2010/main" val="2140746471"/>
+      </p:ext>
+    </p:extLst>
+  </p:cSld>
+  <p:clrMapOvr>
+    <a:masterClrMapping/>
+  </p:clrMapOvr>
+</p:sld>
+</file>
+
 <file path=ppt/slides/slide2.xml><?xml version="1.0" encoding="utf-8"?>
 <p:sld xmlns:a="http://schemas.openxmlformats.org/drawingml/2006/main" xmlns:r="http://schemas.openxmlformats.org/officeDocument/2006/relationships" xmlns:p="http://schemas.openxmlformats.org/presentationml/2006/main">
   <p:cSld>
@@ -3430,11 +3493,7 @@
           <a:p>
             <a:r>
               <a:rPr lang="bg-BG" dirty="0" smtClean="0"/>
-              <a:t>Добавка </a:t>
-            </a:r>
-            <a:r>
-              <a:rPr lang="bg-BG" dirty="0" smtClean="0"/>
-              <a:t>към </a:t>
+              <a:t>Добавка към </a:t>
             </a:r>
             <a:r>
               <a:rPr lang="en-US" dirty="0" smtClean="0"/>
@@ -3557,11 +3616,7 @@
           <a:p>
             <a:r>
               <a:rPr lang="bg-BG" dirty="0" smtClean="0"/>
-              <a:t>Контролира </a:t>
-            </a:r>
-            <a:r>
-              <a:rPr lang="bg-BG" dirty="0" smtClean="0"/>
-              <a:t>писането на хубав код</a:t>
+              <a:t>Контролира писането на хубав код</a:t>
             </a:r>
           </a:p>
           <a:p>
@@ -3569,7 +3624,6 @@
               <a:rPr lang="bg-BG" dirty="0" smtClean="0"/>
               <a:t>По-лесно улавяне на възможни бъгове</a:t>
             </a:r>
-            <a:endParaRPr lang="bg-BG" dirty="0" smtClean="0"/>
           </a:p>
           <a:p>
             <a:r>
@@ -3682,7 +3736,6 @@
               <a:rPr lang="bg-BG" dirty="0" smtClean="0"/>
               <a:t>код </a:t>
             </a:r>
-            <a:endParaRPr lang="bg-BG" dirty="0" smtClean="0"/>
           </a:p>
           <a:p>
             <a:r>
@@ -3697,7 +3750,6 @@
               <a:rPr lang="bg-BG" dirty="0" smtClean="0"/>
               <a:t>му</a:t>
             </a:r>
-            <a:endParaRPr lang="bg-BG" dirty="0" smtClean="0"/>
           </a:p>
           <a:p>
             <a:r>
@@ -3777,19 +3829,15 @@
             <p:ph type="title"/>
           </p:nvPr>
         </p:nvSpPr>
-        <p:spPr>
-          <a:xfrm>
-            <a:off x="179512" y="260648"/>
-            <a:ext cx="8219256" cy="1143000"/>
-          </a:xfrm>
-        </p:spPr>
-        <p:txBody>
-          <a:bodyPr/>
-          <a:lstStyle/>
-          <a:p>
-            <a:r>
-              <a:rPr lang="bg-BG" dirty="0" smtClean="0"/>
-              <a:t>Компоненти и подкомпоненти	</a:t>
+        <p:spPr/>
+        <p:txBody>
+          <a:bodyPr/>
+          <a:lstStyle/>
+          <a:p>
+            <a:pPr algn="ctr"/>
+            <a:r>
+              <a:rPr lang="en-US" dirty="0" smtClean="0"/>
+              <a:t>Code Analysis</a:t>
             </a:r>
             <a:endParaRPr lang="en-US" dirty="0"/>
           </a:p>
@@ -3807,103 +3855,112 @@
         </p:nvSpPr>
         <p:spPr/>
         <p:txBody>
-          <a:bodyPr/>
+          <a:bodyPr>
+            <a:normAutofit/>
+          </a:bodyPr>
           <a:lstStyle/>
           <a:p>
             <a:r>
               <a:rPr lang="en-US" dirty="0" smtClean="0"/>
-              <a:t>Code analysis</a:t>
-            </a:r>
-          </a:p>
-          <a:p>
-            <a:pPr lvl="1"/>
+              <a:t>Code Audit - </a:t>
+            </a:r>
+            <a:r>
+              <a:rPr lang="bg-BG" dirty="0" smtClean="0"/>
+              <a:t>прави </a:t>
+            </a:r>
+            <a:r>
+              <a:rPr lang="bg-BG" dirty="0"/>
+              <a:t>проверка на програмния код дали отговаря на дадени правила. </a:t>
+            </a:r>
+            <a:endParaRPr lang="en-US" dirty="0" smtClean="0"/>
+          </a:p>
+          <a:p>
             <a:r>
               <a:rPr lang="en-US" dirty="0" smtClean="0"/>
-              <a:t>Code Audit</a:t>
-            </a:r>
-          </a:p>
-          <a:p>
-            <a:pPr lvl="1"/>
+              <a:t>Audit Explorer - </a:t>
+            </a:r>
+            <a:r>
+              <a:rPr lang="bg-BG" dirty="0" smtClean="0"/>
+              <a:t>показва </a:t>
+            </a:r>
+            <a:r>
+              <a:rPr lang="bg-BG" dirty="0"/>
+              <a:t>ресурсите, които са създадени от и свързани с </a:t>
+            </a:r>
+            <a:r>
+              <a:rPr lang="en-US" dirty="0"/>
+              <a:t>Code Audit </a:t>
+            </a:r>
+            <a:r>
+              <a:rPr lang="bg-BG" dirty="0"/>
+              <a:t>функционалността. Два вида ресурси се показват: </a:t>
+            </a:r>
+            <a:r>
+              <a:rPr lang="en-US" dirty="0"/>
+              <a:t>Audit Result Set </a:t>
+            </a:r>
+            <a:r>
+              <a:rPr lang="bg-BG" dirty="0"/>
+              <a:t>– показват се нарушенията, установени при проверката; </a:t>
+            </a:r>
+            <a:r>
+              <a:rPr lang="en-US" dirty="0"/>
+              <a:t>Audit Series – </a:t>
+            </a:r>
+            <a:r>
+              <a:rPr lang="bg-BG" dirty="0"/>
+              <a:t>показва се отчет, базиран на серия от </a:t>
+            </a:r>
+            <a:r>
+              <a:rPr lang="en-US" dirty="0"/>
+              <a:t>Audit Result </a:t>
+            </a:r>
             <a:r>
               <a:rPr lang="en-US" dirty="0" smtClean="0"/>
-              <a:t>Audit Rule Sets</a:t>
-            </a:r>
+              <a:t>Set</a:t>
+            </a:r>
+            <a:r>
+              <a:rPr lang="en-US" dirty="0"/>
+              <a:t>s</a:t>
+            </a:r>
+            <a:r>
+              <a:rPr lang="bg-BG" dirty="0" smtClean="0"/>
+              <a:t>.</a:t>
+            </a:r>
+            <a:endParaRPr lang="en-US" dirty="0"/>
           </a:p>
           <a:p>
             <a:r>
               <a:rPr lang="en-US" dirty="0" smtClean="0"/>
-              <a:t>Audit Rule Categories</a:t>
-            </a:r>
-          </a:p>
-          <a:p>
-            <a:pPr lvl="1"/>
-            <a:r>
-              <a:rPr lang="en-US" dirty="0" smtClean="0"/>
-              <a:t>Coding Style.</a:t>
-            </a:r>
-          </a:p>
-          <a:p>
-            <a:pPr lvl="1"/>
-            <a:r>
-              <a:rPr lang="en-US" dirty="0" smtClean="0"/>
-              <a:t>..</a:t>
-            </a:r>
-          </a:p>
-          <a:p>
-            <a:pPr lvl="1"/>
-            <a:r>
-              <a:rPr lang="en-US" dirty="0" smtClean="0"/>
-              <a:t>..</a:t>
-            </a:r>
-          </a:p>
-          <a:p>
-            <a:pPr lvl="1"/>
-            <a:r>
-              <a:rPr lang="en-US" dirty="0" smtClean="0"/>
-              <a:t>…</a:t>
-            </a:r>
-          </a:p>
-          <a:p>
-            <a:r>
-              <a:rPr lang="en-US" dirty="0" smtClean="0"/>
-              <a:t>Metric Categories</a:t>
-            </a:r>
-          </a:p>
-          <a:p>
-            <a:pPr lvl="1"/>
-            <a:r>
-              <a:rPr lang="bg-BG" dirty="0" err="1" smtClean="0"/>
-              <a:t>Сичките</a:t>
-            </a:r>
-            <a:endParaRPr lang="bg-BG" dirty="0" smtClean="0"/>
-          </a:p>
-          <a:p>
-            <a:r>
-              <a:rPr lang="en-US" dirty="0" smtClean="0"/>
-              <a:t>Dependency Analysis – </a:t>
-            </a:r>
-            <a:r>
-              <a:rPr lang="en-US" dirty="0" err="1" smtClean="0"/>
-              <a:t>asd</a:t>
-            </a:r>
-            <a:endParaRPr lang="en-US" dirty="0" smtClean="0"/>
-          </a:p>
-          <a:p>
-            <a:r>
-              <a:rPr lang="en-US" dirty="0" smtClean="0"/>
-              <a:t>Code Coverage</a:t>
-            </a:r>
-          </a:p>
-          <a:p>
-            <a:pPr lvl="1"/>
-            <a:endParaRPr lang="en-US" dirty="0" smtClean="0"/>
+              <a:t>Audit Rule Sets - </a:t>
+            </a:r>
+            <a:r>
+              <a:rPr lang="bg-BG" dirty="0" smtClean="0"/>
+              <a:t>показва </a:t>
+            </a:r>
+            <a:r>
+              <a:rPr lang="bg-BG" dirty="0"/>
+              <a:t>избраният набор от </a:t>
+            </a:r>
+            <a:r>
+              <a:rPr lang="bg-BG" dirty="0" smtClean="0"/>
+              <a:t>правила, </a:t>
+            </a:r>
+            <a:r>
+              <a:rPr lang="bg-BG" dirty="0"/>
+              <a:t>както и всички достъпни правила за проверка.</a:t>
+            </a:r>
+            <a:endParaRPr lang="en-US" dirty="0"/>
+          </a:p>
+          <a:p>
+            <a:endParaRPr lang="en-US" dirty="0"/>
           </a:p>
         </p:txBody>
       </p:sp>
     </p:spTree>
     <p:extLst>
       <p:ext uri="{BB962C8B-B14F-4D97-AF65-F5344CB8AC3E}">
-        <p14:creationId xmlns:p14="http://schemas.microsoft.com/office/powerpoint/2010/main" val="186254039"/>
+        <p14:creationId xmlns:p14="http://schemas.microsoft.com/office/powerpoint/2010/main" val="4158264990"/>
       </p:ext>
     </p:extLst>
   </p:cSld>
@@ -3940,21 +3997,215 @@
             <p:ph type="title"/>
           </p:nvPr>
         </p:nvSpPr>
-        <p:spPr>
-          <a:xfrm>
-            <a:off x="467544" y="2852936"/>
-            <a:ext cx="7620000" cy="1143000"/>
-          </a:xfrm>
-        </p:spPr>
+        <p:spPr/>
         <p:txBody>
           <a:bodyPr/>
           <a:lstStyle/>
           <a:p>
             <a:pPr algn="ctr"/>
             <a:r>
-              <a:rPr lang="bg-BG" dirty="0" smtClean="0"/>
-              <a:t>Демонстрация</a:t>
-            </a:r>
+              <a:rPr lang="en-US" dirty="0" smtClean="0"/>
+              <a:t>Audit Rule Categories</a:t>
+            </a:r>
+            <a:endParaRPr lang="en-US" dirty="0"/>
+          </a:p>
+        </p:txBody>
+      </p:sp>
+      <p:sp>
+        <p:nvSpPr>
+          <p:cNvPr id="3" name="Content Placeholder 2"/>
+          <p:cNvSpPr>
+            <a:spLocks noGrp="1"/>
+          </p:cNvSpPr>
+          <p:nvPr>
+            <p:ph idx="1"/>
+          </p:nvPr>
+        </p:nvSpPr>
+        <p:spPr/>
+        <p:txBody>
+          <a:bodyPr>
+            <a:normAutofit fontScale="70000" lnSpcReduction="20000"/>
+          </a:bodyPr>
+          <a:lstStyle/>
+          <a:p>
+            <a:r>
+              <a:rPr lang="en-US" dirty="0" smtClean="0"/>
+              <a:t>Coding Style - </a:t>
+            </a:r>
+            <a:r>
+              <a:rPr lang="bg-BG" dirty="0" smtClean="0"/>
+              <a:t>правила</a:t>
+            </a:r>
+            <a:r>
+              <a:rPr lang="bg-BG" dirty="0"/>
+              <a:t>, които търсят програмен код, който не отговаря на зададен стил на писане на код</a:t>
+            </a:r>
+            <a:r>
+              <a:rPr lang="bg-BG" dirty="0" smtClean="0"/>
+              <a:t>.</a:t>
+            </a:r>
+            <a:endParaRPr lang="en-US" dirty="0" smtClean="0"/>
+          </a:p>
+          <a:p>
+            <a:r>
+              <a:rPr lang="en-US" dirty="0" smtClean="0"/>
+              <a:t>Comments - </a:t>
+            </a:r>
+            <a:r>
+              <a:rPr lang="bg-BG" dirty="0" smtClean="0"/>
+              <a:t>правила</a:t>
+            </a:r>
+            <a:r>
+              <a:rPr lang="bg-BG" dirty="0"/>
+              <a:t>, които проверяват правилното използване на коментари, които не са от тип </a:t>
+            </a:r>
+            <a:r>
+              <a:rPr lang="en-US" dirty="0"/>
+              <a:t>Javadoc</a:t>
+            </a:r>
+            <a:r>
+              <a:rPr lang="en-US" dirty="0" smtClean="0"/>
+              <a:t>.</a:t>
+            </a:r>
+          </a:p>
+          <a:p>
+            <a:r>
+              <a:rPr lang="en-US" dirty="0" smtClean="0"/>
+              <a:t>Dead Code - </a:t>
+            </a:r>
+            <a:r>
+              <a:rPr lang="bg-BG" dirty="0" smtClean="0"/>
+              <a:t>правила</a:t>
+            </a:r>
+            <a:r>
+              <a:rPr lang="bg-BG" dirty="0"/>
+              <a:t>, които търсят код, който не се използва или не може да бъде достигнат (мъртъв код). </a:t>
+            </a:r>
+            <a:endParaRPr lang="en-US" dirty="0" smtClean="0"/>
+          </a:p>
+          <a:p>
+            <a:r>
+              <a:rPr lang="en-US" dirty="0" smtClean="0"/>
+              <a:t>Exceptions - </a:t>
+            </a:r>
+            <a:r>
+              <a:rPr lang="bg-BG" dirty="0" smtClean="0"/>
+              <a:t>правила</a:t>
+            </a:r>
+            <a:r>
+              <a:rPr lang="bg-BG" dirty="0"/>
+              <a:t>, които проверяват за проблеми, свързани с употребата на изключения в програмния код</a:t>
+            </a:r>
+            <a:r>
+              <a:rPr lang="bg-BG" dirty="0" smtClean="0"/>
+              <a:t>.</a:t>
+            </a:r>
+            <a:endParaRPr lang="en-US" dirty="0"/>
+          </a:p>
+          <a:p>
+            <a:r>
+              <a:rPr lang="en-US" dirty="0" smtClean="0"/>
+              <a:t>Import Usage - </a:t>
+            </a:r>
+            <a:r>
+              <a:rPr lang="bg-BG" dirty="0" smtClean="0"/>
+              <a:t>правила</a:t>
+            </a:r>
+            <a:r>
+              <a:rPr lang="bg-BG" dirty="0"/>
+              <a:t>, които проверяват дали </a:t>
+            </a:r>
+            <a:r>
+              <a:rPr lang="en-US" dirty="0" err="1"/>
+              <a:t>импортите</a:t>
+            </a:r>
+            <a:r>
+              <a:rPr lang="en-US" dirty="0"/>
+              <a:t> </a:t>
+            </a:r>
+            <a:r>
+              <a:rPr lang="bg-BG" dirty="0"/>
+              <a:t>отговарят на общоприетите практики за писане на код.</a:t>
+            </a:r>
+            <a:endParaRPr lang="en-US" dirty="0"/>
+          </a:p>
+          <a:p>
+            <a:r>
+              <a:rPr lang="en-US" dirty="0" smtClean="0"/>
+              <a:t>Inheritance - </a:t>
+            </a:r>
+            <a:r>
+              <a:rPr lang="bg-BG" dirty="0" smtClean="0"/>
+              <a:t>правила</a:t>
+            </a:r>
+            <a:r>
+              <a:rPr lang="bg-BG" dirty="0"/>
+              <a:t>, които проверяват за проблеми, които са свързани с класовата йерархия или могат да бъдат </a:t>
+            </a:r>
+            <a:r>
+              <a:rPr lang="bg-BG" dirty="0" smtClean="0"/>
+              <a:t>видени </a:t>
+            </a:r>
+            <a:r>
+              <a:rPr lang="bg-BG" dirty="0"/>
+              <a:t>само при преглеждане на </a:t>
+            </a:r>
+            <a:r>
+              <a:rPr lang="bg-BG" dirty="0" err="1"/>
+              <a:t>суперкласовете</a:t>
+            </a:r>
+            <a:r>
+              <a:rPr lang="bg-BG" dirty="0"/>
+              <a:t> на клас.</a:t>
+            </a:r>
+            <a:endParaRPr lang="en-US" dirty="0"/>
+          </a:p>
+          <a:p>
+            <a:r>
+              <a:rPr lang="en-US" dirty="0" smtClean="0"/>
+              <a:t>Performance - </a:t>
+            </a:r>
+            <a:r>
+              <a:rPr lang="bg-BG" dirty="0" smtClean="0"/>
+              <a:t>правила</a:t>
+            </a:r>
+            <a:r>
+              <a:rPr lang="bg-BG" dirty="0"/>
+              <a:t>, които откриват използването на практики за писане на код, които могат да доведат до проблеми с производителността. Тези правила не откриват всеки източник на проблеми, нито всичко открито от тях е реален проблем за производителността. </a:t>
+            </a:r>
+            <a:endParaRPr lang="en-US" dirty="0"/>
+          </a:p>
+          <a:p>
+            <a:r>
+              <a:rPr lang="en-US" dirty="0" smtClean="0"/>
+              <a:t>Naming Conventions - </a:t>
+            </a:r>
+            <a:r>
+              <a:rPr lang="bg-BG" dirty="0" smtClean="0"/>
+              <a:t>правила</a:t>
+            </a:r>
+            <a:r>
+              <a:rPr lang="bg-BG" dirty="0"/>
+              <a:t>, които проверяват имената на различни програмни елементи дали отговарят на въведените стандарти и конвенции. </a:t>
+            </a:r>
+            <a:endParaRPr lang="en-US" dirty="0"/>
+          </a:p>
+          <a:p>
+            <a:r>
+              <a:rPr lang="en-US" dirty="0" smtClean="0"/>
+              <a:t>Security - </a:t>
+            </a:r>
+            <a:r>
+              <a:rPr lang="bg-BG" dirty="0" smtClean="0"/>
+              <a:t>правила</a:t>
+            </a:r>
+            <a:r>
+              <a:rPr lang="bg-BG" dirty="0"/>
+              <a:t>, които откриват използването на практики за писане на код, които водят до по-несигурен код. </a:t>
+            </a:r>
+            <a:endParaRPr lang="en-US" dirty="0" smtClean="0"/>
+          </a:p>
+          <a:p>
             <a:endParaRPr lang="en-US" dirty="0"/>
           </a:p>
         </p:txBody>
@@ -3962,7 +4213,586 @@
     </p:spTree>
     <p:extLst>
       <p:ext uri="{BB962C8B-B14F-4D97-AF65-F5344CB8AC3E}">
-        <p14:creationId xmlns:p14="http://schemas.microsoft.com/office/powerpoint/2010/main" val="2140746471"/>
+        <p14:creationId xmlns:p14="http://schemas.microsoft.com/office/powerpoint/2010/main" val="2486542262"/>
+      </p:ext>
+    </p:extLst>
+  </p:cSld>
+  <p:clrMapOvr>
+    <a:masterClrMapping/>
+  </p:clrMapOvr>
+</p:sld>
+</file>
+
+<file path=ppt/slides/slide7.xml><?xml version="1.0" encoding="utf-8"?>
+<p:sld xmlns:a="http://schemas.openxmlformats.org/drawingml/2006/main" xmlns:r="http://schemas.openxmlformats.org/officeDocument/2006/relationships" xmlns:p="http://schemas.openxmlformats.org/presentationml/2006/main">
+  <p:cSld>
+    <p:spTree>
+      <p:nvGrpSpPr>
+        <p:cNvPr id="1" name=""/>
+        <p:cNvGrpSpPr/>
+        <p:nvPr/>
+      </p:nvGrpSpPr>
+      <p:grpSpPr>
+        <a:xfrm>
+          <a:off x="0" y="0"/>
+          <a:ext cx="0" cy="0"/>
+          <a:chOff x="0" y="0"/>
+          <a:chExt cx="0" cy="0"/>
+        </a:xfrm>
+      </p:grpSpPr>
+      <p:sp>
+        <p:nvSpPr>
+          <p:cNvPr id="2" name="Title 1"/>
+          <p:cNvSpPr>
+            <a:spLocks noGrp="1"/>
+          </p:cNvSpPr>
+          <p:nvPr>
+            <p:ph type="title"/>
+          </p:nvPr>
+        </p:nvSpPr>
+        <p:spPr/>
+        <p:txBody>
+          <a:bodyPr/>
+          <a:lstStyle/>
+          <a:p>
+            <a:pPr algn="ctr"/>
+            <a:r>
+              <a:rPr lang="en-US" dirty="0" smtClean="0"/>
+              <a:t>Metric Categories</a:t>
+            </a:r>
+            <a:endParaRPr lang="en-US" dirty="0"/>
+          </a:p>
+        </p:txBody>
+      </p:sp>
+      <p:sp>
+        <p:nvSpPr>
+          <p:cNvPr id="3" name="Content Placeholder 2"/>
+          <p:cNvSpPr>
+            <a:spLocks noGrp="1"/>
+          </p:cNvSpPr>
+          <p:nvPr>
+            <p:ph idx="1"/>
+          </p:nvPr>
+        </p:nvSpPr>
+        <p:spPr/>
+        <p:txBody>
+          <a:bodyPr>
+            <a:normAutofit fontScale="92500" lnSpcReduction="10000"/>
+          </a:bodyPr>
+          <a:lstStyle/>
+          <a:p>
+            <a:pPr marL="114300" indent="0" algn="ctr">
+              <a:buNone/>
+            </a:pPr>
+            <a:r>
+              <a:rPr lang="bg-BG" sz="2600" dirty="0" smtClean="0"/>
+              <a:t>Измерванията </a:t>
+            </a:r>
+            <a:r>
+              <a:rPr lang="bg-BG" sz="2600" dirty="0"/>
+              <a:t>са разделени и групирани по различни </a:t>
+            </a:r>
+            <a:r>
+              <a:rPr lang="bg-BG" sz="2600" dirty="0" smtClean="0"/>
+              <a:t>категории </a:t>
+            </a:r>
+            <a:endParaRPr lang="en-US" sz="2600" dirty="0"/>
+          </a:p>
+          <a:p>
+            <a:r>
+              <a:rPr lang="en-US" dirty="0" smtClean="0"/>
+              <a:t>Basics - </a:t>
+            </a:r>
+            <a:r>
+              <a:rPr lang="bg-BG" dirty="0" smtClean="0"/>
+              <a:t>измервания</a:t>
+            </a:r>
+            <a:r>
+              <a:rPr lang="bg-BG" dirty="0"/>
+              <a:t>, които изчисляват основна информация за програмния </a:t>
+            </a:r>
+            <a:r>
+              <a:rPr lang="bg-BG" dirty="0" smtClean="0"/>
+              <a:t>код:</a:t>
+            </a:r>
+          </a:p>
+          <a:p>
+            <a:pPr lvl="1"/>
+            <a:r>
+              <a:rPr lang="bg-BG" dirty="0" smtClean="0"/>
+              <a:t>Среден </a:t>
+            </a:r>
+            <a:r>
+              <a:rPr lang="bg-BG" dirty="0"/>
+              <a:t>брой редове код на </a:t>
+            </a:r>
+            <a:r>
+              <a:rPr lang="bg-BG" dirty="0" smtClean="0"/>
+              <a:t>метод, </a:t>
+            </a:r>
+            <a:r>
+              <a:rPr lang="bg-BG" dirty="0"/>
+              <a:t>конструктори на </a:t>
+            </a:r>
+            <a:r>
+              <a:rPr lang="bg-BG" dirty="0" smtClean="0"/>
+              <a:t>клас, </a:t>
+            </a:r>
+            <a:r>
+              <a:rPr lang="bg-BG" dirty="0"/>
+              <a:t>полета на </a:t>
+            </a:r>
+            <a:r>
+              <a:rPr lang="bg-BG" dirty="0" smtClean="0"/>
+              <a:t>клас, </a:t>
+            </a:r>
+            <a:r>
+              <a:rPr lang="bg-BG" dirty="0"/>
+              <a:t>методи на </a:t>
+            </a:r>
+            <a:r>
+              <a:rPr lang="bg-BG" dirty="0" smtClean="0"/>
+              <a:t>клас, параметри</a:t>
+            </a:r>
+          </a:p>
+          <a:p>
+            <a:pPr lvl="1"/>
+            <a:r>
+              <a:rPr lang="bg-BG" dirty="0" smtClean="0"/>
+              <a:t>Редове код</a:t>
+            </a:r>
+          </a:p>
+          <a:p>
+            <a:pPr lvl="1"/>
+            <a:r>
+              <a:rPr lang="bg-BG" dirty="0" smtClean="0"/>
+              <a:t>Брой символи, коментари, конструктори, </a:t>
+            </a:r>
+            <a:r>
+              <a:rPr lang="bg-BG" dirty="0"/>
+              <a:t>полета, </a:t>
+            </a:r>
+            <a:r>
+              <a:rPr lang="bg-BG" dirty="0" smtClean="0"/>
+              <a:t>редове</a:t>
+            </a:r>
+            <a:r>
+              <a:rPr lang="bg-BG" dirty="0"/>
+              <a:t>, </a:t>
+            </a:r>
+            <a:r>
+              <a:rPr lang="bg-BG" dirty="0" smtClean="0"/>
+              <a:t>методи, пакети</a:t>
+            </a:r>
+            <a:r>
+              <a:rPr lang="bg-BG" dirty="0"/>
+              <a:t>, </a:t>
+            </a:r>
+            <a:r>
+              <a:rPr lang="bg-BG" dirty="0" smtClean="0"/>
+              <a:t>точки </a:t>
+            </a:r>
+            <a:r>
+              <a:rPr lang="bg-BG" dirty="0"/>
+              <a:t>и запетаи, </a:t>
+            </a:r>
+            <a:r>
+              <a:rPr lang="bg-BG" dirty="0" smtClean="0"/>
+              <a:t>класове</a:t>
+            </a:r>
+            <a:endParaRPr lang="en-US" dirty="0"/>
+          </a:p>
+          <a:p>
+            <a:r>
+              <a:rPr lang="en-US" dirty="0" smtClean="0"/>
+              <a:t>Complexity - </a:t>
+            </a:r>
+            <a:r>
+              <a:rPr lang="bg-BG" dirty="0" smtClean="0"/>
+              <a:t>оценяват </a:t>
+            </a:r>
+            <a:r>
+              <a:rPr lang="bg-BG" dirty="0"/>
+              <a:t>сложността на програмния код.</a:t>
+            </a:r>
+            <a:endParaRPr lang="en-US" dirty="0"/>
+          </a:p>
+          <a:p>
+            <a:r>
+              <a:rPr lang="en-US" dirty="0" smtClean="0"/>
+              <a:t>Dependency - </a:t>
+            </a:r>
+            <a:r>
+              <a:rPr lang="bg-BG" dirty="0" smtClean="0"/>
+              <a:t>измерват </a:t>
+            </a:r>
+            <a:r>
+              <a:rPr lang="bg-BG" dirty="0"/>
+              <a:t>отговорността, самостоятелността и стабилността на тяло програмен код. </a:t>
+            </a:r>
+            <a:endParaRPr lang="en-US" dirty="0"/>
+          </a:p>
+          <a:p>
+            <a:r>
+              <a:rPr lang="en-US" dirty="0" smtClean="0"/>
+              <a:t>Inheritance - </a:t>
+            </a:r>
+            <a:r>
+              <a:rPr lang="bg-BG" dirty="0" smtClean="0"/>
+              <a:t>базирани са на </a:t>
+            </a:r>
+            <a:r>
+              <a:rPr lang="bg-BG" dirty="0"/>
+              <a:t>наследствената структура на програмния код. </a:t>
+            </a:r>
+            <a:endParaRPr lang="en-US" dirty="0"/>
+          </a:p>
+          <a:p>
+            <a:r>
+              <a:rPr lang="en-US" dirty="0" smtClean="0"/>
+              <a:t>Ratio - </a:t>
+            </a:r>
+            <a:r>
+              <a:rPr lang="bg-BG" dirty="0" smtClean="0"/>
+              <a:t>базирани са на </a:t>
+            </a:r>
+            <a:r>
+              <a:rPr lang="bg-BG" dirty="0"/>
+              <a:t>отношението на един вид нещо към друго.</a:t>
+            </a:r>
+            <a:endParaRPr lang="en-US" dirty="0"/>
+          </a:p>
+          <a:p>
+            <a:endParaRPr lang="en-US" dirty="0"/>
+          </a:p>
+        </p:txBody>
+      </p:sp>
+    </p:spTree>
+    <p:extLst>
+      <p:ext uri="{BB962C8B-B14F-4D97-AF65-F5344CB8AC3E}">
+        <p14:creationId xmlns:p14="http://schemas.microsoft.com/office/powerpoint/2010/main" val="2026815680"/>
+      </p:ext>
+    </p:extLst>
+  </p:cSld>
+  <p:clrMapOvr>
+    <a:masterClrMapping/>
+  </p:clrMapOvr>
+</p:sld>
+</file>
+
+<file path=ppt/slides/slide8.xml><?xml version="1.0" encoding="utf-8"?>
+<p:sld xmlns:a="http://schemas.openxmlformats.org/drawingml/2006/main" xmlns:r="http://schemas.openxmlformats.org/officeDocument/2006/relationships" xmlns:p="http://schemas.openxmlformats.org/presentationml/2006/main">
+  <p:cSld>
+    <p:spTree>
+      <p:nvGrpSpPr>
+        <p:cNvPr id="1" name=""/>
+        <p:cNvGrpSpPr/>
+        <p:nvPr/>
+      </p:nvGrpSpPr>
+      <p:grpSpPr>
+        <a:xfrm>
+          <a:off x="0" y="0"/>
+          <a:ext cx="0" cy="0"/>
+          <a:chOff x="0" y="0"/>
+          <a:chExt cx="0" cy="0"/>
+        </a:xfrm>
+      </p:grpSpPr>
+      <p:sp>
+        <p:nvSpPr>
+          <p:cNvPr id="2" name="Title 1"/>
+          <p:cNvSpPr>
+            <a:spLocks noGrp="1"/>
+          </p:cNvSpPr>
+          <p:nvPr>
+            <p:ph type="title"/>
+          </p:nvPr>
+        </p:nvSpPr>
+        <p:spPr/>
+        <p:txBody>
+          <a:bodyPr/>
+          <a:lstStyle/>
+          <a:p>
+            <a:pPr algn="ctr"/>
+            <a:r>
+              <a:rPr lang="en-US" dirty="0" smtClean="0"/>
+              <a:t>Dependency Analysis</a:t>
+            </a:r>
+            <a:endParaRPr lang="en-US" dirty="0"/>
+          </a:p>
+        </p:txBody>
+      </p:sp>
+      <p:sp>
+        <p:nvSpPr>
+          <p:cNvPr id="3" name="Content Placeholder 2"/>
+          <p:cNvSpPr>
+            <a:spLocks noGrp="1"/>
+          </p:cNvSpPr>
+          <p:nvPr>
+            <p:ph idx="1"/>
+          </p:nvPr>
+        </p:nvSpPr>
+        <p:spPr/>
+        <p:txBody>
+          <a:bodyPr>
+            <a:normAutofit lnSpcReduction="10000"/>
+          </a:bodyPr>
+          <a:lstStyle/>
+          <a:p>
+            <a:r>
+              <a:rPr lang="en-US" dirty="0" smtClean="0"/>
+              <a:t>Dependencies - </a:t>
+            </a:r>
+            <a:r>
+              <a:rPr lang="bg-BG" dirty="0" smtClean="0"/>
+              <a:t>екранът </a:t>
+            </a:r>
+            <a:r>
+              <a:rPr lang="bg-BG" dirty="0"/>
+              <a:t>на зависимостите показва резултатите от анализ на зависимостите и може да бъде използван да се разграничат два проекта или пакета</a:t>
+            </a:r>
+            <a:r>
+              <a:rPr lang="bg-BG" dirty="0" smtClean="0"/>
+              <a:t>. </a:t>
+            </a:r>
+            <a:r>
+              <a:rPr lang="bg-BG" dirty="0"/>
+              <a:t>Системата поддържа списък от достъпни анализи на зависимостите. </a:t>
+            </a:r>
+            <a:endParaRPr lang="en-US" dirty="0"/>
+          </a:p>
+          <a:p>
+            <a:r>
+              <a:rPr lang="bg-BG" dirty="0" smtClean="0"/>
+              <a:t>Нива на детайлност – откритите зависимости могат </a:t>
+            </a:r>
+            <a:r>
+              <a:rPr lang="bg-BG" dirty="0"/>
+              <a:t>да бъдат погледнати на три различни нива на </a:t>
+            </a:r>
+            <a:r>
+              <a:rPr lang="bg-BG" dirty="0" smtClean="0"/>
+              <a:t>детайлност:</a:t>
+            </a:r>
+          </a:p>
+          <a:p>
+            <a:pPr lvl="1"/>
+            <a:r>
+              <a:rPr lang="bg-BG" dirty="0"/>
+              <a:t>З</a:t>
+            </a:r>
+            <a:r>
+              <a:rPr lang="bg-BG" dirty="0" smtClean="0"/>
+              <a:t>ависимости </a:t>
+            </a:r>
+            <a:r>
+              <a:rPr lang="bg-BG" dirty="0"/>
+              <a:t>между </a:t>
+            </a:r>
+            <a:r>
+              <a:rPr lang="bg-BG" dirty="0" smtClean="0"/>
+              <a:t>проекти</a:t>
+            </a:r>
+          </a:p>
+          <a:p>
+            <a:pPr lvl="1"/>
+            <a:r>
+              <a:rPr lang="bg-BG" dirty="0" smtClean="0"/>
+              <a:t>Зависимости между пакети</a:t>
+            </a:r>
+          </a:p>
+          <a:p>
+            <a:pPr lvl="1"/>
+            <a:r>
+              <a:rPr lang="bg-BG" dirty="0" smtClean="0"/>
+              <a:t>Зависимости между класове</a:t>
+            </a:r>
+            <a:endParaRPr lang="bg-BG" dirty="0"/>
+          </a:p>
+          <a:p>
+            <a:r>
+              <a:rPr lang="bg-BG" dirty="0" smtClean="0"/>
+              <a:t>Когато </a:t>
+            </a:r>
+            <a:r>
+              <a:rPr lang="bg-BG" dirty="0"/>
+              <a:t>се избере анализ се показва най-високото възможно ниво на детайлност</a:t>
+            </a:r>
+            <a:r>
+              <a:rPr lang="bg-BG" dirty="0" smtClean="0"/>
+              <a:t>.</a:t>
+            </a:r>
+            <a:endParaRPr lang="en-US" dirty="0" smtClean="0"/>
+          </a:p>
+          <a:p>
+            <a:r>
+              <a:rPr lang="en-US" dirty="0" smtClean="0"/>
+              <a:t>HTML Report - </a:t>
+            </a:r>
+            <a:r>
+              <a:rPr lang="bg-BG" dirty="0"/>
+              <a:t>с</a:t>
+            </a:r>
+            <a:r>
+              <a:rPr lang="bg-BG" dirty="0" smtClean="0"/>
+              <a:t>ъздава </a:t>
+            </a:r>
+            <a:r>
+              <a:rPr lang="bg-BG" dirty="0"/>
+              <a:t>отчет за анализа на зависимостите в </a:t>
+            </a:r>
+            <a:r>
+              <a:rPr lang="en-US" dirty="0"/>
+              <a:t>HTML </a:t>
+            </a:r>
+            <a:r>
+              <a:rPr lang="bg-BG" dirty="0"/>
+              <a:t>формат. </a:t>
+            </a:r>
+            <a:endParaRPr lang="en-US" dirty="0"/>
+          </a:p>
+          <a:p>
+            <a:endParaRPr lang="en-US" dirty="0"/>
+          </a:p>
+          <a:p>
+            <a:endParaRPr lang="en-US" dirty="0"/>
+          </a:p>
+        </p:txBody>
+      </p:sp>
+    </p:spTree>
+    <p:extLst>
+      <p:ext uri="{BB962C8B-B14F-4D97-AF65-F5344CB8AC3E}">
+        <p14:creationId xmlns:p14="http://schemas.microsoft.com/office/powerpoint/2010/main" val="181072881"/>
+      </p:ext>
+    </p:extLst>
+  </p:cSld>
+  <p:clrMapOvr>
+    <a:masterClrMapping/>
+  </p:clrMapOvr>
+</p:sld>
+</file>
+
+<file path=ppt/slides/slide9.xml><?xml version="1.0" encoding="utf-8"?>
+<p:sld xmlns:a="http://schemas.openxmlformats.org/drawingml/2006/main" xmlns:r="http://schemas.openxmlformats.org/officeDocument/2006/relationships" xmlns:p="http://schemas.openxmlformats.org/presentationml/2006/main">
+  <p:cSld>
+    <p:spTree>
+      <p:nvGrpSpPr>
+        <p:cNvPr id="1" name=""/>
+        <p:cNvGrpSpPr/>
+        <p:nvPr/>
+      </p:nvGrpSpPr>
+      <p:grpSpPr>
+        <a:xfrm>
+          <a:off x="0" y="0"/>
+          <a:ext cx="0" cy="0"/>
+          <a:chOff x="0" y="0"/>
+          <a:chExt cx="0" cy="0"/>
+        </a:xfrm>
+      </p:grpSpPr>
+      <p:sp>
+        <p:nvSpPr>
+          <p:cNvPr id="2" name="Title 1"/>
+          <p:cNvSpPr>
+            <a:spLocks noGrp="1"/>
+          </p:cNvSpPr>
+          <p:nvPr>
+            <p:ph type="title"/>
+          </p:nvPr>
+        </p:nvSpPr>
+        <p:spPr/>
+        <p:txBody>
+          <a:bodyPr/>
+          <a:lstStyle/>
+          <a:p>
+            <a:pPr algn="ctr"/>
+            <a:r>
+              <a:rPr lang="en-US" dirty="0" smtClean="0"/>
+              <a:t>Code Coverage</a:t>
+            </a:r>
+            <a:endParaRPr lang="en-US" dirty="0"/>
+          </a:p>
+        </p:txBody>
+      </p:sp>
+      <p:sp>
+        <p:nvSpPr>
+          <p:cNvPr id="3" name="Content Placeholder 2"/>
+          <p:cNvSpPr>
+            <a:spLocks noGrp="1"/>
+          </p:cNvSpPr>
+          <p:nvPr>
+            <p:ph idx="1"/>
+          </p:nvPr>
+        </p:nvSpPr>
+        <p:spPr/>
+        <p:txBody>
+          <a:bodyPr/>
+          <a:lstStyle/>
+          <a:p>
+            <a:r>
+              <a:rPr lang="en-US" dirty="0" smtClean="0"/>
+              <a:t>Code Coverage - </a:t>
+            </a:r>
+            <a:r>
+              <a:rPr lang="bg-BG" dirty="0" smtClean="0"/>
+              <a:t>измерва </a:t>
+            </a:r>
+            <a:r>
+              <a:rPr lang="bg-BG" dirty="0"/>
+              <a:t>каква част от програмния код се изпълнява. Най-често се </a:t>
+            </a:r>
+            <a:r>
+              <a:rPr lang="bg-BG" dirty="0" smtClean="0"/>
+              <a:t>използва, </a:t>
+            </a:r>
+            <a:r>
+              <a:rPr lang="bg-BG" dirty="0"/>
+              <a:t>за да </a:t>
+            </a:r>
+            <a:r>
+              <a:rPr lang="bg-BG" dirty="0" smtClean="0"/>
+              <a:t>се оцени </a:t>
+            </a:r>
+            <a:r>
+              <a:rPr lang="bg-BG" dirty="0"/>
+              <a:t>ефективността на тестовете в преминаването през всички възможни пътища в кода. </a:t>
+            </a:r>
+            <a:endParaRPr lang="en-US" dirty="0"/>
+          </a:p>
+          <a:p>
+            <a:r>
+              <a:rPr lang="en-US" dirty="0" smtClean="0"/>
+              <a:t>HTML Report - </a:t>
+            </a:r>
+            <a:r>
+              <a:rPr lang="bg-BG" dirty="0"/>
+              <a:t>с</a:t>
+            </a:r>
+            <a:r>
+              <a:rPr lang="bg-BG" dirty="0" smtClean="0"/>
+              <a:t>ъздава </a:t>
+            </a:r>
+            <a:r>
+              <a:rPr lang="bg-BG" dirty="0"/>
+              <a:t>отчет за обхвата на програмния код в </a:t>
+            </a:r>
+            <a:r>
+              <a:rPr lang="en-US" dirty="0"/>
+              <a:t>HTML </a:t>
+            </a:r>
+            <a:r>
+              <a:rPr lang="bg-BG" dirty="0"/>
+              <a:t>формат. </a:t>
+            </a:r>
+            <a:endParaRPr lang="en-US" dirty="0"/>
+          </a:p>
+          <a:p>
+            <a:endParaRPr lang="en-US" dirty="0"/>
+          </a:p>
+        </p:txBody>
+      </p:sp>
+    </p:spTree>
+    <p:extLst>
+      <p:ext uri="{BB962C8B-B14F-4D97-AF65-F5344CB8AC3E}">
+        <p14:creationId xmlns:p14="http://schemas.microsoft.com/office/powerpoint/2010/main" val="726568105"/>
       </p:ext>
     </p:extLst>
   </p:cSld>

</xml_diff>

<commit_message>
Simplify code rules slide and add architecture view in the paper
</commit_message>
<xml_diff>
--- a/CodePro-Analytix.pptx
+++ b/CodePro-Analytix.pptx
@@ -115,7 +115,7 @@
   </p:defaultTextStyle>
   <p:extLst>
     <p:ext uri="{EFAFB233-063F-42B5-8137-9DF3F51BA10A}">
-      <p15:sldGuideLst xmlns="" xmlns:p15="http://schemas.microsoft.com/office/powerpoint/2012/main">
+      <p15:sldGuideLst xmlns:p15="http://schemas.microsoft.com/office/powerpoint/2012/main">
         <p15:guide id="1" orient="horz" pos="2160">
           <p15:clr>
             <a:srgbClr val="A4A3A4"/>
@@ -327,7 +327,7 @@
             <a:fld id="{68B45380-BEAC-40B8-8A9E-2284AB95F218}" type="datetimeFigureOut">
               <a:rPr lang="en-US" smtClean="0"/>
               <a:pPr/>
-              <a:t>2/13/2016</a:t>
+              <a:t>2/15/2016</a:t>
             </a:fld>
             <a:endParaRPr lang="en-US"/>
           </a:p>
@@ -494,7 +494,7 @@
             <a:fld id="{68B45380-BEAC-40B8-8A9E-2284AB95F218}" type="datetimeFigureOut">
               <a:rPr lang="en-US" smtClean="0"/>
               <a:pPr/>
-              <a:t>2/13/2016</a:t>
+              <a:t>2/15/2016</a:t>
             </a:fld>
             <a:endParaRPr lang="en-US"/>
           </a:p>
@@ -671,7 +671,7 @@
             <a:fld id="{68B45380-BEAC-40B8-8A9E-2284AB95F218}" type="datetimeFigureOut">
               <a:rPr lang="en-US" smtClean="0"/>
               <a:pPr/>
-              <a:t>2/13/2016</a:t>
+              <a:t>2/15/2016</a:t>
             </a:fld>
             <a:endParaRPr lang="en-US"/>
           </a:p>
@@ -838,7 +838,7 @@
             <a:fld id="{68B45380-BEAC-40B8-8A9E-2284AB95F218}" type="datetimeFigureOut">
               <a:rPr lang="en-US" smtClean="0"/>
               <a:pPr/>
-              <a:t>2/13/2016</a:t>
+              <a:t>2/15/2016</a:t>
             </a:fld>
             <a:endParaRPr lang="en-US"/>
           </a:p>
@@ -1081,7 +1081,7 @@
             <a:fld id="{68B45380-BEAC-40B8-8A9E-2284AB95F218}" type="datetimeFigureOut">
               <a:rPr lang="en-US" smtClean="0"/>
               <a:pPr/>
-              <a:t>2/13/2016</a:t>
+              <a:t>2/15/2016</a:t>
             </a:fld>
             <a:endParaRPr lang="en-US"/>
           </a:p>
@@ -1366,7 +1366,7 @@
             <a:fld id="{68B45380-BEAC-40B8-8A9E-2284AB95F218}" type="datetimeFigureOut">
               <a:rPr lang="en-US" smtClean="0"/>
               <a:pPr/>
-              <a:t>2/13/2016</a:t>
+              <a:t>2/15/2016</a:t>
             </a:fld>
             <a:endParaRPr lang="en-US"/>
           </a:p>
@@ -1797,7 +1797,7 @@
             <a:fld id="{68B45380-BEAC-40B8-8A9E-2284AB95F218}" type="datetimeFigureOut">
               <a:rPr lang="en-US" smtClean="0"/>
               <a:pPr/>
-              <a:t>2/13/2016</a:t>
+              <a:t>2/15/2016</a:t>
             </a:fld>
             <a:endParaRPr lang="en-US"/>
           </a:p>
@@ -1912,7 +1912,7 @@
             <a:fld id="{68B45380-BEAC-40B8-8A9E-2284AB95F218}" type="datetimeFigureOut">
               <a:rPr lang="en-US" smtClean="0"/>
               <a:pPr/>
-              <a:t>2/13/2016</a:t>
+              <a:t>2/15/2016</a:t>
             </a:fld>
             <a:endParaRPr lang="en-US"/>
           </a:p>
@@ -2004,7 +2004,7 @@
             <a:fld id="{68B45380-BEAC-40B8-8A9E-2284AB95F218}" type="datetimeFigureOut">
               <a:rPr lang="en-US" smtClean="0"/>
               <a:pPr/>
-              <a:t>2/13/2016</a:t>
+              <a:t>2/15/2016</a:t>
             </a:fld>
             <a:endParaRPr lang="en-US"/>
           </a:p>
@@ -2195,7 +2195,7 @@
             <a:fld id="{68B45380-BEAC-40B8-8A9E-2284AB95F218}" type="datetimeFigureOut">
               <a:rPr lang="en-US" smtClean="0"/>
               <a:pPr/>
-              <a:t>2/13/2016</a:t>
+              <a:t>2/15/2016</a:t>
             </a:fld>
             <a:endParaRPr lang="en-US"/>
           </a:p>
@@ -2515,7 +2515,7 @@
             <a:fld id="{68B45380-BEAC-40B8-8A9E-2284AB95F218}" type="datetimeFigureOut">
               <a:rPr lang="en-US" smtClean="0"/>
               <a:pPr/>
-              <a:t>2/13/2016</a:t>
+              <a:t>2/15/2016</a:t>
             </a:fld>
             <a:endParaRPr lang="en-US"/>
           </a:p>
@@ -2897,7 +2897,7 @@
             <a:fld id="{68B45380-BEAC-40B8-8A9E-2284AB95F218}" type="datetimeFigureOut">
               <a:rPr lang="en-US" smtClean="0"/>
               <a:pPr/>
-              <a:t>2/13/2016</a:t>
+              <a:t>2/15/2016</a:t>
             </a:fld>
             <a:endParaRPr lang="en-US"/>
           </a:p>
@@ -3279,27 +3279,15 @@
             <a:pPr algn="r"/>
             <a:r>
               <a:rPr lang="bg-BG" dirty="0" smtClean="0"/>
-              <a:t>Анализ </a:t>
-            </a:r>
-            <a:r>
-              <a:rPr lang="bg-BG" dirty="0" smtClean="0"/>
-              <a:t>и </a:t>
+              <a:t>Анализ и </a:t>
             </a:r>
             <a:r>
               <a:rPr lang="bg-BG" smtClean="0"/>
-              <a:t>разбиране </a:t>
-            </a:r>
-            <a:r>
-              <a:rPr lang="bg-BG" smtClean="0"/>
-              <a:t>архитектурата </a:t>
-            </a:r>
-            <a:r>
-              <a:rPr lang="bg-BG" dirty="0" smtClean="0"/>
-              <a:t>на </a:t>
-            </a:r>
-            <a:r>
-              <a:rPr lang="bg-BG" dirty="0" smtClean="0"/>
-              <a:t>големи софтуерни продукти на </a:t>
+              <a:t>разбиране архитектурата </a:t>
+            </a:r>
+            <a:r>
+              <a:rPr lang="bg-BG" dirty="0" smtClean="0"/>
+              <a:t>на големи софтуерни продукти на </a:t>
             </a:r>
             <a:r>
               <a:rPr lang="en-US" dirty="0" smtClean="0"/>
@@ -3371,13 +3359,8 @@
             <a:pPr algn="r"/>
             <a:r>
               <a:rPr lang="bg-BG" i="1" dirty="0" smtClean="0"/>
-              <a:t>Антонио </a:t>
-            </a:r>
-            <a:r>
-              <a:rPr lang="bg-BG" i="1" dirty="0" smtClean="0"/>
-              <a:t>Найденов Николов, 80867, група 4</a:t>
-            </a:r>
-            <a:endParaRPr lang="bg-BG" i="1" dirty="0" smtClean="0"/>
+              <a:t>Антонио Найденов Николов, 80867, група 4</a:t>
+            </a:r>
           </a:p>
           <a:p>
             <a:pPr algn="r"/>
@@ -3390,11 +3373,7 @@
             <a:pPr algn="r"/>
             <a:r>
               <a:rPr lang="bg-BG" dirty="0" smtClean="0"/>
-              <a:t>Четвърти курс</a:t>
-            </a:r>
-            <a:r>
-              <a:rPr lang="bg-BG" dirty="0" smtClean="0"/>
-              <a:t>, специалност Компютърни науки</a:t>
+              <a:t>Четвърти курс, специалност Компютърни науки</a:t>
             </a:r>
             <a:endParaRPr lang="en-US" dirty="0"/>
           </a:p>
@@ -3403,7 +3382,7 @@
     </p:spTree>
     <p:extLst>
       <p:ext uri="{BB962C8B-B14F-4D97-AF65-F5344CB8AC3E}">
-        <p14:creationId xmlns:p14="http://schemas.microsoft.com/office/powerpoint/2010/main" xmlns="" val="3557275336"/>
+        <p14:creationId xmlns:p14="http://schemas.microsoft.com/office/powerpoint/2010/main" val="3557275336"/>
       </p:ext>
     </p:extLst>
   </p:cSld>
@@ -3469,7 +3448,7 @@
     </p:spTree>
     <p:extLst>
       <p:ext uri="{BB962C8B-B14F-4D97-AF65-F5344CB8AC3E}">
-        <p14:creationId xmlns:p14="http://schemas.microsoft.com/office/powerpoint/2010/main" xmlns="" val="2140746471"/>
+        <p14:creationId xmlns:p14="http://schemas.microsoft.com/office/powerpoint/2010/main" val="2140746471"/>
       </p:ext>
     </p:extLst>
   </p:cSld>
@@ -3588,7 +3567,7 @@
     </p:spTree>
     <p:extLst>
       <p:ext uri="{BB962C8B-B14F-4D97-AF65-F5344CB8AC3E}">
-        <p14:creationId xmlns:p14="http://schemas.microsoft.com/office/powerpoint/2010/main" xmlns="" val="3189271781"/>
+        <p14:creationId xmlns:p14="http://schemas.microsoft.com/office/powerpoint/2010/main" val="3189271781"/>
       </p:ext>
     </p:extLst>
   </p:cSld>
@@ -3702,7 +3681,7 @@
     </p:spTree>
     <p:extLst>
       <p:ext uri="{BB962C8B-B14F-4D97-AF65-F5344CB8AC3E}">
-        <p14:creationId xmlns:p14="http://schemas.microsoft.com/office/powerpoint/2010/main" xmlns="" val="1097461361"/>
+        <p14:creationId xmlns:p14="http://schemas.microsoft.com/office/powerpoint/2010/main" val="1097461361"/>
       </p:ext>
     </p:extLst>
   </p:cSld>
@@ -3854,7 +3833,7 @@
     </p:spTree>
     <p:extLst>
       <p:ext uri="{BB962C8B-B14F-4D97-AF65-F5344CB8AC3E}">
-        <p14:creationId xmlns:p14="http://schemas.microsoft.com/office/powerpoint/2010/main" xmlns="" val="437667780"/>
+        <p14:creationId xmlns:p14="http://schemas.microsoft.com/office/powerpoint/2010/main" val="437667780"/>
       </p:ext>
     </p:extLst>
   </p:cSld>
@@ -4022,7 +4001,7 @@
     </p:spTree>
     <p:extLst>
       <p:ext uri="{BB962C8B-B14F-4D97-AF65-F5344CB8AC3E}">
-        <p14:creationId xmlns:p14="http://schemas.microsoft.com/office/powerpoint/2010/main" xmlns="" val="4158264990"/>
+        <p14:creationId xmlns:p14="http://schemas.microsoft.com/office/powerpoint/2010/main" val="4158264990"/>
       </p:ext>
     </p:extLst>
   </p:cSld>
@@ -4086,188 +4065,66 @@
         <p:spPr/>
         <p:txBody>
           <a:bodyPr>
-            <a:normAutofit fontScale="70000" lnSpcReduction="20000"/>
+            <a:normAutofit/>
           </a:bodyPr>
           <a:lstStyle/>
           <a:p>
             <a:r>
               <a:rPr lang="en-US" dirty="0" smtClean="0"/>
-              <a:t>Coding Style - </a:t>
-            </a:r>
-            <a:r>
-              <a:rPr lang="bg-BG" dirty="0" smtClean="0"/>
-              <a:t>правила</a:t>
-            </a:r>
-            <a:r>
-              <a:rPr lang="bg-BG" dirty="0"/>
-              <a:t>, които търсят програмен код, който не отговаря на зададен стил на писане на код</a:t>
-            </a:r>
-            <a:r>
-              <a:rPr lang="bg-BG" dirty="0" smtClean="0"/>
-              <a:t>.</a:t>
-            </a:r>
-            <a:endParaRPr lang="en-US" dirty="0" smtClean="0"/>
-          </a:p>
-          <a:p>
+              <a:t>Coding </a:t>
+            </a:r>
             <a:r>
               <a:rPr lang="en-US" dirty="0" smtClean="0"/>
-              <a:t>Comments - </a:t>
-            </a:r>
-            <a:r>
-              <a:rPr lang="bg-BG" dirty="0" smtClean="0"/>
-              <a:t>правила</a:t>
-            </a:r>
-            <a:r>
-              <a:rPr lang="bg-BG" dirty="0"/>
-              <a:t>, които проверяват правилното използване на коментари, които не са от тип </a:t>
-            </a:r>
-            <a:r>
-              <a:rPr lang="en-US" dirty="0"/>
-              <a:t>Javadoc</a:t>
-            </a:r>
+              <a:t>Style </a:t>
+            </a:r>
+          </a:p>
+          <a:p>
             <a:r>
               <a:rPr lang="en-US" dirty="0" smtClean="0"/>
-              <a:t>.</a:t>
+              <a:t>Comments </a:t>
             </a:r>
           </a:p>
           <a:p>
             <a:r>
               <a:rPr lang="en-US" dirty="0" smtClean="0"/>
-              <a:t>Dead Code - </a:t>
-            </a:r>
-            <a:r>
-              <a:rPr lang="bg-BG" dirty="0" smtClean="0"/>
-              <a:t>правила</a:t>
-            </a:r>
-            <a:r>
-              <a:rPr lang="bg-BG" dirty="0"/>
-              <a:t>, които търсят код, който не се използва или не може да бъде достигнат (мъртъв код). </a:t>
-            </a:r>
-            <a:endParaRPr lang="en-US" dirty="0" smtClean="0"/>
+              <a:t>Dead Code</a:t>
+            </a:r>
           </a:p>
           <a:p>
             <a:r>
               <a:rPr lang="en-US" dirty="0" smtClean="0"/>
-              <a:t>Exceptions - </a:t>
-            </a:r>
-            <a:r>
-              <a:rPr lang="bg-BG" dirty="0" smtClean="0"/>
-              <a:t>правила</a:t>
-            </a:r>
-            <a:r>
-              <a:rPr lang="bg-BG" dirty="0"/>
-              <a:t>, които проверяват за проблеми, свързани с употребата на изключения в програмния код</a:t>
-            </a:r>
-            <a:r>
-              <a:rPr lang="bg-BG" dirty="0" smtClean="0"/>
-              <a:t>.</a:t>
-            </a:r>
-            <a:endParaRPr lang="en-US" dirty="0"/>
+              <a:t>Exceptions</a:t>
+            </a:r>
           </a:p>
           <a:p>
             <a:r>
               <a:rPr lang="en-US" dirty="0" smtClean="0"/>
-              <a:t>Import Usage - </a:t>
-            </a:r>
-            <a:r>
-              <a:rPr lang="bg-BG" dirty="0" smtClean="0"/>
-              <a:t>правила</a:t>
-            </a:r>
-            <a:r>
-              <a:rPr lang="bg-BG" dirty="0"/>
-              <a:t>, които проверяват дали </a:t>
-            </a:r>
-            <a:r>
-              <a:rPr lang="en-US" dirty="0" err="1"/>
-              <a:t>импортите</a:t>
-            </a:r>
-            <a:r>
-              <a:rPr lang="en-US" dirty="0"/>
-              <a:t> </a:t>
-            </a:r>
-            <a:r>
-              <a:rPr lang="bg-BG" dirty="0"/>
-              <a:t>отговарят на общоприетите практики за писане на код.</a:t>
-            </a:r>
-            <a:endParaRPr lang="en-US" dirty="0"/>
+              <a:t>Import Usage</a:t>
+            </a:r>
           </a:p>
           <a:p>
             <a:r>
               <a:rPr lang="en-US" dirty="0" smtClean="0"/>
-              <a:t>Inheritance - </a:t>
-            </a:r>
-            <a:r>
-              <a:rPr lang="bg-BG" dirty="0" smtClean="0"/>
-              <a:t>правила</a:t>
-            </a:r>
-            <a:r>
-              <a:rPr lang="bg-BG" dirty="0"/>
-              <a:t>, които проверяват за проблеми, които са свързани с класовата йерархия или могат да бъдат </a:t>
-            </a:r>
-            <a:r>
-              <a:rPr lang="bg-BG" dirty="0" smtClean="0"/>
-              <a:t>видени </a:t>
-            </a:r>
-            <a:r>
-              <a:rPr lang="bg-BG" dirty="0"/>
-              <a:t>само при преглеждане на </a:t>
-            </a:r>
-            <a:r>
-              <a:rPr lang="bg-BG" dirty="0" err="1"/>
-              <a:t>суперкласовете</a:t>
-            </a:r>
-            <a:r>
-              <a:rPr lang="bg-BG" dirty="0"/>
-              <a:t> на клас.</a:t>
-            </a:r>
-            <a:endParaRPr lang="en-US" dirty="0"/>
+              <a:t>Inheritance </a:t>
+            </a:r>
           </a:p>
           <a:p>
             <a:r>
               <a:rPr lang="en-US" dirty="0" smtClean="0"/>
-              <a:t>Performance - </a:t>
-            </a:r>
-            <a:r>
-              <a:rPr lang="bg-BG" dirty="0" smtClean="0"/>
-              <a:t>правила</a:t>
-            </a:r>
-            <a:r>
-              <a:rPr lang="bg-BG" dirty="0"/>
-              <a:t>, които откриват използването на практики за писане на код, които могат да доведат до проблеми с производителността. Тези правила не откриват всеки източник на проблеми, нито всичко открито от тях е реален проблем за производителността. </a:t>
-            </a:r>
-            <a:endParaRPr lang="en-US" dirty="0"/>
+              <a:t>Performance </a:t>
+            </a:r>
           </a:p>
           <a:p>
             <a:r>
               <a:rPr lang="en-US" dirty="0" smtClean="0"/>
-              <a:t>Naming Conventions - </a:t>
-            </a:r>
-            <a:r>
-              <a:rPr lang="bg-BG" dirty="0" smtClean="0"/>
-              <a:t>правила</a:t>
-            </a:r>
-            <a:r>
-              <a:rPr lang="bg-BG" dirty="0"/>
-              <a:t>, които проверяват имената на различни програмни елементи дали отговарят на въведените стандарти и конвенции. </a:t>
-            </a:r>
-            <a:endParaRPr lang="en-US" dirty="0"/>
+              <a:t>Naming Conventions</a:t>
+            </a:r>
           </a:p>
           <a:p>
             <a:r>
               <a:rPr lang="en-US" dirty="0" smtClean="0"/>
-              <a:t>Security - </a:t>
-            </a:r>
-            <a:r>
-              <a:rPr lang="bg-BG" dirty="0" smtClean="0"/>
-              <a:t>правила</a:t>
-            </a:r>
-            <a:r>
-              <a:rPr lang="bg-BG" dirty="0"/>
-              <a:t>, които откриват използването на практики за писане на код, които водят до по-несигурен код. </a:t>
-            </a:r>
-            <a:endParaRPr lang="en-US" dirty="0" smtClean="0"/>
-          </a:p>
-          <a:p>
+              <a:t>Security</a:t>
+            </a:r>
             <a:endParaRPr lang="en-US" dirty="0"/>
           </a:p>
         </p:txBody>
@@ -4275,7 +4132,7 @@
     </p:spTree>
     <p:extLst>
       <p:ext uri="{BB962C8B-B14F-4D97-AF65-F5344CB8AC3E}">
-        <p14:creationId xmlns:p14="http://schemas.microsoft.com/office/powerpoint/2010/main" xmlns="" val="2486542262"/>
+        <p14:creationId xmlns:p14="http://schemas.microsoft.com/office/powerpoint/2010/main" val="2486542262"/>
       </p:ext>
     </p:extLst>
   </p:cSld>
@@ -4532,7 +4389,7 @@
     </p:spTree>
     <p:extLst>
       <p:ext uri="{BB962C8B-B14F-4D97-AF65-F5344CB8AC3E}">
-        <p14:creationId xmlns:p14="http://schemas.microsoft.com/office/powerpoint/2010/main" xmlns="" val="2026815680"/>
+        <p14:creationId xmlns:p14="http://schemas.microsoft.com/office/powerpoint/2010/main" val="2026815680"/>
       </p:ext>
     </p:extLst>
   </p:cSld>
@@ -4723,7 +4580,7 @@
     </p:spTree>
     <p:extLst>
       <p:ext uri="{BB962C8B-B14F-4D97-AF65-F5344CB8AC3E}">
-        <p14:creationId xmlns:p14="http://schemas.microsoft.com/office/powerpoint/2010/main" xmlns="" val="181072881"/>
+        <p14:creationId xmlns:p14="http://schemas.microsoft.com/office/powerpoint/2010/main" val="181072881"/>
       </p:ext>
     </p:extLst>
   </p:cSld>
@@ -4854,7 +4711,7 @@
     </p:spTree>
     <p:extLst>
       <p:ext uri="{BB962C8B-B14F-4D97-AF65-F5344CB8AC3E}">
-        <p14:creationId xmlns:p14="http://schemas.microsoft.com/office/powerpoint/2010/main" xmlns="" val="726568105"/>
+        <p14:creationId xmlns:p14="http://schemas.microsoft.com/office/powerpoint/2010/main" val="726568105"/>
       </p:ext>
     </p:extLst>
   </p:cSld>

</xml_diff>

<commit_message>
Adds more slides for metrics component
</commit_message>
<xml_diff>
--- a/CodePro-Analytix.pptx
+++ b/CodePro-Analytix.pptx
@@ -12,11 +12,13 @@
     <p:sldId id="266" r:id="rId6"/>
     <p:sldId id="267" r:id="rId7"/>
     <p:sldId id="265" r:id="rId8"/>
-    <p:sldId id="264" r:id="rId9"/>
-    <p:sldId id="262" r:id="rId10"/>
-    <p:sldId id="268" r:id="rId11"/>
-    <p:sldId id="263" r:id="rId12"/>
-    <p:sldId id="261" r:id="rId13"/>
+    <p:sldId id="269" r:id="rId9"/>
+    <p:sldId id="264" r:id="rId10"/>
+    <p:sldId id="270" r:id="rId11"/>
+    <p:sldId id="262" r:id="rId12"/>
+    <p:sldId id="268" r:id="rId13"/>
+    <p:sldId id="263" r:id="rId14"/>
+    <p:sldId id="261" r:id="rId15"/>
   </p:sldIdLst>
   <p:sldSz cx="9144000" cy="6858000" type="screen4x3"/>
   <p:notesSz cx="6858000" cy="9144000"/>
@@ -3435,6 +3437,306 @@
           <a:p>
             <a:pPr algn="ctr"/>
             <a:r>
+              <a:rPr lang="en-US" dirty="0"/>
+              <a:t>Metric Categories</a:t>
+            </a:r>
+            <a:endParaRPr lang="bg-BG" dirty="0"/>
+          </a:p>
+        </p:txBody>
+      </p:sp>
+      <p:sp>
+        <p:nvSpPr>
+          <p:cNvPr id="3" name="Content Placeholder 2"/>
+          <p:cNvSpPr>
+            <a:spLocks noGrp="1"/>
+          </p:cNvSpPr>
+          <p:nvPr>
+            <p:ph idx="1"/>
+          </p:nvPr>
+        </p:nvSpPr>
+        <p:spPr/>
+        <p:txBody>
+          <a:bodyPr/>
+          <a:lstStyle/>
+          <a:p>
+            <a:r>
+              <a:rPr lang="en-US" dirty="0" smtClean="0"/>
+              <a:t>Complexity</a:t>
+            </a:r>
+          </a:p>
+          <a:p>
+            <a:pPr lvl="1"/>
+            <a:r>
+              <a:rPr lang="en-US" dirty="0" smtClean="0"/>
+              <a:t>Average block depth</a:t>
+            </a:r>
+          </a:p>
+          <a:p>
+            <a:pPr lvl="1"/>
+            <a:r>
+              <a:rPr lang="en-US" dirty="0" smtClean="0"/>
+              <a:t>Average </a:t>
+            </a:r>
+            <a:r>
+              <a:rPr lang="en-US" dirty="0" err="1" smtClean="0"/>
+              <a:t>cyclomatic</a:t>
+            </a:r>
+            <a:r>
+              <a:rPr lang="en-US" dirty="0" smtClean="0"/>
+              <a:t> complexity</a:t>
+            </a:r>
+          </a:p>
+          <a:p>
+            <a:pPr lvl="1"/>
+            <a:r>
+              <a:rPr lang="en-US" dirty="0" smtClean="0"/>
+              <a:t>Weighted methods</a:t>
+            </a:r>
+            <a:endParaRPr lang="en-US" dirty="0"/>
+          </a:p>
+          <a:p>
+            <a:r>
+              <a:rPr lang="en-US" dirty="0" smtClean="0"/>
+              <a:t>Dependency</a:t>
+            </a:r>
+          </a:p>
+          <a:p>
+            <a:pPr lvl="1"/>
+            <a:r>
+              <a:rPr lang="en-US" dirty="0" smtClean="0"/>
+              <a:t>Abstractness</a:t>
+            </a:r>
+          </a:p>
+          <a:p>
+            <a:pPr lvl="1"/>
+            <a:r>
+              <a:rPr lang="en-US" dirty="0" smtClean="0"/>
+              <a:t>Afferent couplings </a:t>
+            </a:r>
+            <a:endParaRPr lang="en-US" dirty="0"/>
+          </a:p>
+          <a:p>
+            <a:r>
+              <a:rPr lang="en-US" dirty="0" smtClean="0"/>
+              <a:t>Inheritance</a:t>
+            </a:r>
+          </a:p>
+          <a:p>
+            <a:pPr lvl="1"/>
+            <a:r>
+              <a:rPr lang="en-US" dirty="0" smtClean="0"/>
+              <a:t>Average depth of </a:t>
+            </a:r>
+            <a:r>
+              <a:rPr lang="en-US" dirty="0"/>
+              <a:t>i</a:t>
+            </a:r>
+            <a:r>
+              <a:rPr lang="en-US" dirty="0" smtClean="0"/>
+              <a:t>nheritance hierarchy</a:t>
+            </a:r>
+          </a:p>
+          <a:p>
+            <a:pPr lvl="1"/>
+            <a:r>
+              <a:rPr lang="en-US" dirty="0" smtClean="0"/>
+              <a:t>Average number of subtypes</a:t>
+            </a:r>
+            <a:endParaRPr lang="en-US" dirty="0"/>
+          </a:p>
+          <a:p>
+            <a:r>
+              <a:rPr lang="en-US" dirty="0" smtClean="0"/>
+              <a:t>Ratio</a:t>
+            </a:r>
+          </a:p>
+          <a:p>
+            <a:pPr lvl="1"/>
+            <a:r>
+              <a:rPr lang="en-US" dirty="0" smtClean="0"/>
+              <a:t>Comments ratio</a:t>
+            </a:r>
+            <a:endParaRPr lang="en-US" dirty="0"/>
+          </a:p>
+        </p:txBody>
+      </p:sp>
+    </p:spTree>
+    <p:extLst>
+      <p:ext uri="{BB962C8B-B14F-4D97-AF65-F5344CB8AC3E}">
+        <p14:creationId xmlns:p14="http://schemas.microsoft.com/office/powerpoint/2010/main" val="3433880750"/>
+      </p:ext>
+    </p:extLst>
+  </p:cSld>
+  <p:clrMapOvr>
+    <a:masterClrMapping/>
+  </p:clrMapOvr>
+</p:sld>
+</file>
+
+<file path=ppt/slides/slide11.xml><?xml version="1.0" encoding="utf-8"?>
+<p:sld xmlns:a="http://schemas.openxmlformats.org/drawingml/2006/main" xmlns:r="http://schemas.openxmlformats.org/officeDocument/2006/relationships" xmlns:p="http://schemas.openxmlformats.org/presentationml/2006/main">
+  <p:cSld>
+    <p:spTree>
+      <p:nvGrpSpPr>
+        <p:cNvPr id="1" name=""/>
+        <p:cNvGrpSpPr/>
+        <p:nvPr/>
+      </p:nvGrpSpPr>
+      <p:grpSpPr>
+        <a:xfrm>
+          <a:off x="0" y="0"/>
+          <a:ext cx="0" cy="0"/>
+          <a:chOff x="0" y="0"/>
+          <a:chExt cx="0" cy="0"/>
+        </a:xfrm>
+      </p:grpSpPr>
+      <p:sp>
+        <p:nvSpPr>
+          <p:cNvPr id="2" name="Title 1"/>
+          <p:cNvSpPr>
+            <a:spLocks noGrp="1"/>
+          </p:cNvSpPr>
+          <p:nvPr>
+            <p:ph type="title"/>
+          </p:nvPr>
+        </p:nvSpPr>
+        <p:spPr/>
+        <p:txBody>
+          <a:bodyPr/>
+          <a:lstStyle/>
+          <a:p>
+            <a:pPr algn="ctr"/>
+            <a:r>
+              <a:rPr lang="en-US" dirty="0" smtClean="0"/>
+              <a:t>Dependency Analysis</a:t>
+            </a:r>
+            <a:endParaRPr lang="en-US" dirty="0"/>
+          </a:p>
+        </p:txBody>
+      </p:sp>
+      <p:sp>
+        <p:nvSpPr>
+          <p:cNvPr id="3" name="Content Placeholder 2"/>
+          <p:cNvSpPr>
+            <a:spLocks noGrp="1"/>
+          </p:cNvSpPr>
+          <p:nvPr>
+            <p:ph idx="1"/>
+          </p:nvPr>
+        </p:nvSpPr>
+        <p:spPr/>
+        <p:txBody>
+          <a:bodyPr>
+            <a:normAutofit/>
+          </a:bodyPr>
+          <a:lstStyle/>
+          <a:p>
+            <a:r>
+              <a:rPr lang="en-US" dirty="0" smtClean="0"/>
+              <a:t>Dependencies</a:t>
+            </a:r>
+          </a:p>
+          <a:p>
+            <a:r>
+              <a:rPr lang="bg-BG" dirty="0" smtClean="0"/>
+              <a:t>Нива на детайлност</a:t>
+            </a:r>
+          </a:p>
+          <a:p>
+            <a:pPr marL="114300" indent="0">
+              <a:buNone/>
+            </a:pPr>
+            <a:r>
+              <a:rPr lang="bg-BG" dirty="0" smtClean="0"/>
+              <a:t> </a:t>
+            </a:r>
+            <a:endParaRPr lang="en-US" dirty="0"/>
+          </a:p>
+          <a:p>
+            <a:endParaRPr lang="en-US" dirty="0"/>
+          </a:p>
+          <a:p>
+            <a:endParaRPr lang="en-US" dirty="0"/>
+          </a:p>
+        </p:txBody>
+      </p:sp>
+      <p:pic>
+        <p:nvPicPr>
+          <p:cNvPr id="4" name="Picture 3"/>
+          <p:cNvPicPr>
+            <a:picLocks noChangeAspect="1"/>
+          </p:cNvPicPr>
+          <p:nvPr/>
+        </p:nvPicPr>
+        <p:blipFill>
+          <a:blip r:embed="rId2">
+            <a:extLst>
+              <a:ext uri="{28A0092B-C50C-407E-A947-70E740481C1C}">
+                <a14:useLocalDpi xmlns:a14="http://schemas.microsoft.com/office/drawing/2010/main" val="0"/>
+              </a:ext>
+            </a:extLst>
+          </a:blip>
+          <a:stretch>
+            <a:fillRect/>
+          </a:stretch>
+        </p:blipFill>
+        <p:spPr>
+          <a:xfrm>
+            <a:off x="1115616" y="2564904"/>
+            <a:ext cx="6120680" cy="3603117"/>
+          </a:xfrm>
+          <a:prstGeom prst="rect">
+            <a:avLst/>
+          </a:prstGeom>
+        </p:spPr>
+      </p:pic>
+    </p:spTree>
+    <p:extLst>
+      <p:ext uri="{BB962C8B-B14F-4D97-AF65-F5344CB8AC3E}">
+        <p14:creationId xmlns:p14="http://schemas.microsoft.com/office/powerpoint/2010/main" val="181072881"/>
+      </p:ext>
+    </p:extLst>
+  </p:cSld>
+  <p:clrMapOvr>
+    <a:masterClrMapping/>
+  </p:clrMapOvr>
+</p:sld>
+</file>
+
+<file path=ppt/slides/slide12.xml><?xml version="1.0" encoding="utf-8"?>
+<p:sld xmlns:a="http://schemas.openxmlformats.org/drawingml/2006/main" xmlns:r="http://schemas.openxmlformats.org/officeDocument/2006/relationships" xmlns:p="http://schemas.openxmlformats.org/presentationml/2006/main">
+  <p:cSld>
+    <p:spTree>
+      <p:nvGrpSpPr>
+        <p:cNvPr id="1" name=""/>
+        <p:cNvGrpSpPr/>
+        <p:nvPr/>
+      </p:nvGrpSpPr>
+      <p:grpSpPr>
+        <a:xfrm>
+          <a:off x="0" y="0"/>
+          <a:ext cx="0" cy="0"/>
+          <a:chOff x="0" y="0"/>
+          <a:chExt cx="0" cy="0"/>
+        </a:xfrm>
+      </p:grpSpPr>
+      <p:sp>
+        <p:nvSpPr>
+          <p:cNvPr id="2" name="Title 1"/>
+          <p:cNvSpPr>
+            <a:spLocks noGrp="1"/>
+          </p:cNvSpPr>
+          <p:nvPr>
+            <p:ph type="title"/>
+          </p:nvPr>
+        </p:nvSpPr>
+        <p:spPr/>
+        <p:txBody>
+          <a:bodyPr/>
+          <a:lstStyle/>
+          <a:p>
+            <a:pPr algn="ctr"/>
+            <a:r>
               <a:rPr lang="en-US" dirty="0" smtClean="0"/>
               <a:t>Dependency Analysis</a:t>
             </a:r>
@@ -3485,7 +3787,7 @@
 </p:sld>
 </file>
 
-<file path=ppt/slides/slide11.xml><?xml version="1.0" encoding="utf-8"?>
+<file path=ppt/slides/slide13.xml><?xml version="1.0" encoding="utf-8"?>
 <p:sld xmlns:a="http://schemas.openxmlformats.org/drawingml/2006/main" xmlns:r="http://schemas.openxmlformats.org/officeDocument/2006/relationships" xmlns:p="http://schemas.openxmlformats.org/presentationml/2006/main">
   <p:cSld>
     <p:spTree>
@@ -3543,11 +3845,7 @@
           <a:p>
             <a:r>
               <a:rPr lang="en-US" dirty="0" smtClean="0"/>
-              <a:t>Code </a:t>
-            </a:r>
-            <a:r>
-              <a:rPr lang="en-US" dirty="0" smtClean="0"/>
-              <a:t>Coverage</a:t>
+              <a:t>Code Coverage</a:t>
             </a:r>
             <a:endParaRPr lang="en-US" dirty="0"/>
           </a:p>
@@ -3596,7 +3894,7 @@
 </p:sld>
 </file>
 
-<file path=ppt/slides/slide12.xml><?xml version="1.0" encoding="utf-8"?>
+<file path=ppt/slides/slide14.xml><?xml version="1.0" encoding="utf-8"?>
 <p:sld xmlns:a="http://schemas.openxmlformats.org/drawingml/2006/main" xmlns:r="http://schemas.openxmlformats.org/officeDocument/2006/relationships" xmlns:p="http://schemas.openxmlformats.org/presentationml/2006/main">
   <p:cSld>
     <p:spTree>
@@ -4483,9 +4781,9 @@
             <a:pPr algn="ctr"/>
             <a:r>
               <a:rPr lang="en-US" dirty="0" smtClean="0"/>
-              <a:t>Metric Categories</a:t>
-            </a:r>
-            <a:endParaRPr lang="en-US" dirty="0"/>
+              <a:t>Metrics</a:t>
+            </a:r>
+            <a:endParaRPr lang="bg-BG" dirty="0"/>
           </a:p>
         </p:txBody>
       </p:sp>
@@ -4501,201 +4799,74 @@
         </p:nvSpPr>
         <p:spPr/>
         <p:txBody>
-          <a:bodyPr>
-            <a:normAutofit fontScale="92500" lnSpcReduction="10000"/>
-          </a:bodyPr>
-          <a:lstStyle/>
-          <a:p>
-            <a:pPr marL="114300" indent="0" algn="ctr">
-              <a:buNone/>
-            </a:pPr>
-            <a:r>
-              <a:rPr lang="bg-BG" sz="2600" dirty="0" smtClean="0"/>
-              <a:t>Измерванията </a:t>
-            </a:r>
-            <a:r>
-              <a:rPr lang="bg-BG" sz="2600" dirty="0"/>
-              <a:t>са разделени и групирани по различни </a:t>
-            </a:r>
-            <a:r>
-              <a:rPr lang="bg-BG" sz="2600" dirty="0" smtClean="0"/>
-              <a:t>категории </a:t>
-            </a:r>
-            <a:endParaRPr lang="en-US" sz="2600" dirty="0"/>
-          </a:p>
-          <a:p>
-            <a:r>
-              <a:rPr lang="en-US" dirty="0" smtClean="0"/>
-              <a:t>Basics - </a:t>
-            </a:r>
+          <a:bodyPr/>
+          <a:lstStyle/>
+          <a:p>
             <a:r>
               <a:rPr lang="bg-BG" dirty="0" smtClean="0"/>
-              <a:t>измервания</a:t>
-            </a:r>
-            <a:r>
-              <a:rPr lang="bg-BG" dirty="0"/>
-              <a:t>, които изчисляват основна информация за програмния </a:t>
-            </a:r>
+              <a:t>При пускане се създават множество резултати от измервания</a:t>
+            </a:r>
+          </a:p>
+          <a:p>
             <a:r>
               <a:rPr lang="bg-BG" dirty="0" smtClean="0"/>
-              <a:t>код:</a:t>
-            </a:r>
-          </a:p>
-          <a:p>
-            <a:pPr lvl="1"/>
+              <a:t>Прагове на допустими нарушения</a:t>
+            </a:r>
+          </a:p>
+          <a:p>
             <a:r>
               <a:rPr lang="bg-BG" dirty="0" smtClean="0"/>
-              <a:t>Среден </a:t>
-            </a:r>
-            <a:r>
-              <a:rPr lang="bg-BG" dirty="0"/>
-              <a:t>брой редове код на </a:t>
-            </a:r>
-            <a:r>
-              <a:rPr lang="bg-BG" dirty="0" smtClean="0"/>
-              <a:t>метод, </a:t>
-            </a:r>
-            <a:r>
-              <a:rPr lang="bg-BG" dirty="0"/>
-              <a:t>конструктори на </a:t>
-            </a:r>
-            <a:r>
-              <a:rPr lang="bg-BG" dirty="0" smtClean="0"/>
-              <a:t>клас, </a:t>
-            </a:r>
-            <a:r>
-              <a:rPr lang="bg-BG" dirty="0"/>
-              <a:t>полета на </a:t>
-            </a:r>
-            <a:r>
-              <a:rPr lang="bg-BG" dirty="0" smtClean="0"/>
-              <a:t>клас, </a:t>
-            </a:r>
-            <a:r>
-              <a:rPr lang="bg-BG" dirty="0"/>
-              <a:t>методи на </a:t>
-            </a:r>
-            <a:r>
-              <a:rPr lang="bg-BG" dirty="0" smtClean="0"/>
-              <a:t>клас, параметри</a:t>
-            </a:r>
-          </a:p>
-          <a:p>
-            <a:pPr lvl="1"/>
-            <a:r>
-              <a:rPr lang="bg-BG" dirty="0" smtClean="0"/>
-              <a:t>Редове код</a:t>
-            </a:r>
-          </a:p>
-          <a:p>
-            <a:pPr lvl="1"/>
-            <a:r>
-              <a:rPr lang="bg-BG" dirty="0" smtClean="0"/>
-              <a:t>Брой символи, коментари, конструктори, </a:t>
-            </a:r>
-            <a:r>
-              <a:rPr lang="bg-BG" dirty="0"/>
-              <a:t>полета, </a:t>
-            </a:r>
-            <a:r>
-              <a:rPr lang="bg-BG" dirty="0" smtClean="0"/>
-              <a:t>редове</a:t>
-            </a:r>
-            <a:r>
-              <a:rPr lang="bg-BG" dirty="0"/>
-              <a:t>, </a:t>
-            </a:r>
-            <a:r>
-              <a:rPr lang="bg-BG" dirty="0" smtClean="0"/>
-              <a:t>методи, пакети</a:t>
-            </a:r>
-            <a:r>
-              <a:rPr lang="bg-BG" dirty="0"/>
-              <a:t>, </a:t>
-            </a:r>
-            <a:r>
-              <a:rPr lang="bg-BG" dirty="0" smtClean="0"/>
-              <a:t>точки </a:t>
-            </a:r>
-            <a:r>
-              <a:rPr lang="bg-BG" dirty="0"/>
-              <a:t>и запетаи, </a:t>
-            </a:r>
-            <a:r>
-              <a:rPr lang="bg-BG" dirty="0" smtClean="0"/>
-              <a:t>класове</a:t>
-            </a:r>
-            <a:endParaRPr lang="en-US" dirty="0"/>
-          </a:p>
-          <a:p>
-            <a:r>
-              <a:rPr lang="en-US" dirty="0" smtClean="0"/>
-              <a:t>Complexity - </a:t>
-            </a:r>
-            <a:r>
-              <a:rPr lang="bg-BG" dirty="0" smtClean="0"/>
-              <a:t>оценяват </a:t>
-            </a:r>
-            <a:r>
-              <a:rPr lang="bg-BG" dirty="0"/>
-              <a:t>сложността на програмния код.</a:t>
-            </a:r>
-            <a:endParaRPr lang="en-US" dirty="0"/>
-          </a:p>
-          <a:p>
-            <a:r>
-              <a:rPr lang="en-US" dirty="0" smtClean="0"/>
-              <a:t>Dependency - </a:t>
-            </a:r>
-            <a:r>
-              <a:rPr lang="bg-BG" dirty="0" smtClean="0"/>
-              <a:t>измерват </a:t>
-            </a:r>
-            <a:r>
-              <a:rPr lang="bg-BG" dirty="0"/>
-              <a:t>отговорността, самостоятелността и стабилността на тяло програмен код. </a:t>
-            </a:r>
-            <a:endParaRPr lang="en-US" dirty="0"/>
-          </a:p>
-          <a:p>
-            <a:r>
-              <a:rPr lang="en-US" dirty="0" smtClean="0"/>
-              <a:t>Inheritance - </a:t>
-            </a:r>
-            <a:r>
-              <a:rPr lang="bg-BG" dirty="0" smtClean="0"/>
-              <a:t>базирани са на </a:t>
-            </a:r>
-            <a:r>
-              <a:rPr lang="bg-BG" dirty="0"/>
-              <a:t>наследствената структура на програмния код. </a:t>
-            </a:r>
-            <a:endParaRPr lang="en-US" dirty="0"/>
-          </a:p>
-          <a:p>
-            <a:r>
-              <a:rPr lang="en-US" dirty="0" smtClean="0"/>
-              <a:t>Ratio - </a:t>
-            </a:r>
-            <a:r>
-              <a:rPr lang="bg-BG" dirty="0" smtClean="0"/>
-              <a:t>базирани са на </a:t>
-            </a:r>
-            <a:r>
-              <a:rPr lang="bg-BG" dirty="0"/>
-              <a:t>отношението на един вид нещо към друго.</a:t>
-            </a:r>
-            <a:endParaRPr lang="en-US" dirty="0"/>
-          </a:p>
-          <a:p>
-            <a:endParaRPr lang="en-US" dirty="0"/>
-          </a:p>
-        </p:txBody>
-      </p:sp>
+              <a:t>Таблица с измерванията</a:t>
+            </a:r>
+            <a:endParaRPr lang="bg-BG" dirty="0"/>
+          </a:p>
+        </p:txBody>
+      </p:sp>
+      <p:pic>
+        <p:nvPicPr>
+          <p:cNvPr id="1026" name="Picture 2" descr="https://developers.google.com/java-dev-tools/codepro/doc/images/metrics_view.gif"/>
+          <p:cNvPicPr>
+            <a:picLocks noChangeAspect="1" noChangeArrowheads="1"/>
+          </p:cNvPicPr>
+          <p:nvPr/>
+        </p:nvPicPr>
+        <p:blipFill>
+          <a:blip r:embed="rId2">
+            <a:extLst>
+              <a:ext uri="{28A0092B-C50C-407E-A947-70E740481C1C}">
+                <a14:useLocalDpi xmlns:a14="http://schemas.microsoft.com/office/drawing/2010/main" val="0"/>
+              </a:ext>
+            </a:extLst>
+          </a:blip>
+          <a:srcRect/>
+          <a:stretch>
+            <a:fillRect/>
+          </a:stretch>
+        </p:blipFill>
+        <p:spPr bwMode="auto">
+          <a:xfrm>
+            <a:off x="578695" y="3429000"/>
+            <a:ext cx="7498505" cy="2971800"/>
+          </a:xfrm>
+          <a:prstGeom prst="rect">
+            <a:avLst/>
+          </a:prstGeom>
+          <a:noFill/>
+          <a:extLst>
+            <a:ext uri="{909E8E84-426E-40DD-AFC4-6F175D3DCCD1}">
+              <a14:hiddenFill xmlns:a14="http://schemas.microsoft.com/office/drawing/2010/main">
+                <a:solidFill>
+                  <a:srgbClr val="FFFFFF"/>
+                </a:solidFill>
+              </a14:hiddenFill>
+            </a:ext>
+          </a:extLst>
+        </p:spPr>
+      </p:pic>
     </p:spTree>
     <p:extLst>
       <p:ext uri="{BB962C8B-B14F-4D97-AF65-F5344CB8AC3E}">
-        <p14:creationId xmlns:p14="http://schemas.microsoft.com/office/powerpoint/2010/main" val="2026815680"/>
+        <p14:creationId xmlns:p14="http://schemas.microsoft.com/office/powerpoint/2010/main" val="1413962985"/>
       </p:ext>
     </p:extLst>
   </p:cSld>
@@ -4740,7 +4911,7 @@
             <a:pPr algn="ctr"/>
             <a:r>
               <a:rPr lang="en-US" dirty="0" smtClean="0"/>
-              <a:t>Dependency Analysis</a:t>
+              <a:t>Metric Categories</a:t>
             </a:r>
             <a:endParaRPr lang="en-US" dirty="0"/>
           </a:p>
@@ -4756,7 +4927,12 @@
             <p:ph idx="1"/>
           </p:nvPr>
         </p:nvSpPr>
-        <p:spPr/>
+        <p:spPr>
+          <a:xfrm>
+            <a:off x="323528" y="1417638"/>
+            <a:ext cx="7364428" cy="4415705"/>
+          </a:xfrm>
+        </p:spPr>
         <p:txBody>
           <a:bodyPr>
             <a:normAutofit/>
@@ -4765,47 +4941,114 @@
           <a:p>
             <a:r>
               <a:rPr lang="en-US" dirty="0" smtClean="0"/>
-              <a:t>Dependencies</a:t>
-            </a:r>
-          </a:p>
-          <a:p>
+              <a:t>Basics</a:t>
+            </a:r>
+          </a:p>
+          <a:p>
+            <a:pPr lvl="1"/>
             <a:r>
               <a:rPr lang="bg-BG" dirty="0" smtClean="0"/>
-              <a:t>Нива </a:t>
+              <a:t>Среден </a:t>
+            </a:r>
+            <a:r>
+              <a:rPr lang="bg-BG" dirty="0"/>
+              <a:t>брой редове код на </a:t>
             </a:r>
             <a:r>
               <a:rPr lang="bg-BG" dirty="0" smtClean="0"/>
-              <a:t>на </a:t>
-            </a:r>
-            <a:r>
-              <a:rPr lang="bg-BG" dirty="0" smtClean="0"/>
-              <a:t>детайлност</a:t>
-            </a:r>
-            <a:endParaRPr lang="bg-BG" dirty="0" smtClean="0"/>
-          </a:p>
-          <a:p>
-            <a:pPr marL="114300" indent="0">
-              <a:buNone/>
-            </a:pPr>
+              <a:t>метод</a:t>
+            </a:r>
+            <a:r>
+              <a:rPr lang="en-US" dirty="0" smtClean="0"/>
+              <a:t>,</a:t>
+            </a:r>
             <a:r>
               <a:rPr lang="bg-BG" dirty="0" smtClean="0"/>
               <a:t> </a:t>
             </a:r>
-            <a:endParaRPr lang="en-US" dirty="0"/>
-          </a:p>
-          <a:p>
-            <a:endParaRPr lang="en-US" dirty="0"/>
-          </a:p>
-          <a:p>
+            <a:r>
+              <a:rPr lang="bg-BG" dirty="0"/>
+              <a:t>конструктори на </a:t>
+            </a:r>
+            <a:r>
+              <a:rPr lang="bg-BG" dirty="0" smtClean="0"/>
+              <a:t>клас, </a:t>
+            </a:r>
+            <a:r>
+              <a:rPr lang="bg-BG" dirty="0"/>
+              <a:t>полета на </a:t>
+            </a:r>
+            <a:r>
+              <a:rPr lang="bg-BG" dirty="0" smtClean="0"/>
+              <a:t>клас, </a:t>
+            </a:r>
+            <a:r>
+              <a:rPr lang="bg-BG" dirty="0"/>
+              <a:t>методи на </a:t>
+            </a:r>
+            <a:r>
+              <a:rPr lang="bg-BG" dirty="0" smtClean="0"/>
+              <a:t>клас, параметри</a:t>
+            </a:r>
+          </a:p>
+          <a:p>
+            <a:pPr lvl="1"/>
+            <a:r>
+              <a:rPr lang="bg-BG" dirty="0" smtClean="0"/>
+              <a:t>Редове код</a:t>
+            </a:r>
+          </a:p>
+          <a:p>
+            <a:pPr lvl="1"/>
+            <a:r>
+              <a:rPr lang="bg-BG" dirty="0" smtClean="0"/>
+              <a:t>Брой символи, коментари, конструктори, </a:t>
+            </a:r>
+            <a:r>
+              <a:rPr lang="bg-BG" dirty="0"/>
+              <a:t>полета, </a:t>
+            </a:r>
+            <a:r>
+              <a:rPr lang="bg-BG" dirty="0" smtClean="0"/>
+              <a:t>редове</a:t>
+            </a:r>
+            <a:r>
+              <a:rPr lang="bg-BG" dirty="0"/>
+              <a:t>, </a:t>
+            </a:r>
+            <a:r>
+              <a:rPr lang="bg-BG" dirty="0" smtClean="0"/>
+              <a:t>методи, пакети</a:t>
+            </a:r>
+            <a:r>
+              <a:rPr lang="bg-BG" dirty="0"/>
+              <a:t>, </a:t>
+            </a:r>
+            <a:r>
+              <a:rPr lang="bg-BG" dirty="0" smtClean="0"/>
+              <a:t>точки </a:t>
+            </a:r>
+            <a:r>
+              <a:rPr lang="bg-BG" dirty="0"/>
+              <a:t>и запетаи, </a:t>
+            </a:r>
+            <a:r>
+              <a:rPr lang="bg-BG" dirty="0" smtClean="0"/>
+              <a:t>класове</a:t>
+            </a:r>
+            <a:endParaRPr lang="en-US" dirty="0" smtClean="0"/>
+          </a:p>
+          <a:p>
+            <a:pPr lvl="1"/>
             <a:endParaRPr lang="en-US" dirty="0"/>
           </a:p>
         </p:txBody>
       </p:sp>
       <p:pic>
         <p:nvPicPr>
-          <p:cNvPr id="4" name="Picture 3"/>
+          <p:cNvPr id="2052" name="Picture 4" descr="https://developers.google.com/java-dev-tools/codepro/doc/images/metrics_view_graph.gif"/>
           <p:cNvPicPr>
-            <a:picLocks noChangeAspect="1"/>
+            <a:picLocks noChangeAspect="1" noChangeArrowheads="1"/>
           </p:cNvPicPr>
           <p:nvPr/>
         </p:nvPicPr>
@@ -4817,24 +5060,35 @@
               </a:ext>
             </a:extLst>
           </a:blip>
+          <a:srcRect/>
           <a:stretch>
             <a:fillRect/>
           </a:stretch>
         </p:blipFill>
-        <p:spPr>
+        <p:spPr bwMode="auto">
           <a:xfrm>
-            <a:off x="1115616" y="2564904"/>
-            <a:ext cx="6120680" cy="3603117"/>
+            <a:off x="457200" y="3625490"/>
+            <a:ext cx="7502511" cy="2973388"/>
           </a:xfrm>
           <a:prstGeom prst="rect">
             <a:avLst/>
           </a:prstGeom>
+          <a:noFill/>
+          <a:extLst>
+            <a:ext uri="{909E8E84-426E-40DD-AFC4-6F175D3DCCD1}">
+              <a14:hiddenFill xmlns:a14="http://schemas.microsoft.com/office/drawing/2010/main">
+                <a:solidFill>
+                  <a:srgbClr val="FFFFFF"/>
+                </a:solidFill>
+              </a14:hiddenFill>
+            </a:ext>
+          </a:extLst>
         </p:spPr>
       </p:pic>
     </p:spTree>
     <p:extLst>
       <p:ext uri="{BB962C8B-B14F-4D97-AF65-F5344CB8AC3E}">
-        <p14:creationId xmlns:p14="http://schemas.microsoft.com/office/powerpoint/2010/main" val="181072881"/>
+        <p14:creationId xmlns:p14="http://schemas.microsoft.com/office/powerpoint/2010/main" val="2026815680"/>
       </p:ext>
     </p:extLst>
   </p:cSld>

</xml_diff>